<commit_message>
Convert & Deploy Funktionen mit key
</commit_message>
<xml_diff>
--- a/oriDocs/Architektur.pptx
+++ b/oriDocs/Architektur.pptx
@@ -119,7 +119,7 @@
 <file path=ppt/revisionInfo.xml><?xml version="1.0" encoding="utf-8"?>
 <p1510:revInfo xmlns:a="http://schemas.openxmlformats.org/drawingml/2006/main" xmlns:r="http://schemas.openxmlformats.org/officeDocument/2006/relationships" xmlns:p1510="http://schemas.microsoft.com/office/powerpoint/2015/10/main">
   <p1510:revLst>
-    <p1510:client id="{EE105636-491D-40CE-9D33-638D2C6FE6D6}" v="10" dt="2019-10-03T16:59:06.892"/>
+    <p1510:client id="{EE105636-491D-40CE-9D33-638D2C6FE6D6}" v="19" dt="2019-10-15T09:34:12.859"/>
   </p1510:revLst>
 </p1510:revInfo>
 </file>
@@ -129,7 +129,7 @@
   <pc:docChgLst>
     <pc:chgData name="Knop, Roger" userId="6e18df92-ca78-483d-9f5e-e7e1767bd246" providerId="ADAL" clId="{EE105636-491D-40CE-9D33-638D2C6FE6D6}"/>
     <pc:docChg chg="custSel addSld modSld">
-      <pc:chgData name="Knop, Roger" userId="6e18df92-ca78-483d-9f5e-e7e1767bd246" providerId="ADAL" clId="{EE105636-491D-40CE-9D33-638D2C6FE6D6}" dt="2019-10-03T16:59:34.783" v="76" actId="20577"/>
+      <pc:chgData name="Knop, Roger" userId="6e18df92-ca78-483d-9f5e-e7e1767bd246" providerId="ADAL" clId="{EE105636-491D-40CE-9D33-638D2C6FE6D6}" dt="2019-10-15T09:34:28.868" v="150" actId="14100"/>
       <pc:docMkLst>
         <pc:docMk/>
       </pc:docMkLst>
@@ -148,20 +148,132 @@
           </ac:spMkLst>
         </pc:spChg>
       </pc:sldChg>
-      <pc:sldChg chg="addSp modSp add">
-        <pc:chgData name="Knop, Roger" userId="6e18df92-ca78-483d-9f5e-e7e1767bd246" providerId="ADAL" clId="{EE105636-491D-40CE-9D33-638D2C6FE6D6}" dt="2019-10-03T16:59:34.783" v="76" actId="20577"/>
+      <pc:sldChg chg="addSp delSp modSp add">
+        <pc:chgData name="Knop, Roger" userId="6e18df92-ca78-483d-9f5e-e7e1767bd246" providerId="ADAL" clId="{EE105636-491D-40CE-9D33-638D2C6FE6D6}" dt="2019-10-15T09:34:28.868" v="150" actId="14100"/>
         <pc:sldMkLst>
           <pc:docMk/>
           <pc:sldMk cId="867983266" sldId="258"/>
         </pc:sldMkLst>
-        <pc:spChg chg="add mod ord">
-          <ac:chgData name="Knop, Roger" userId="6e18df92-ca78-483d-9f5e-e7e1767bd246" providerId="ADAL" clId="{EE105636-491D-40CE-9D33-638D2C6FE6D6}" dt="2019-10-03T16:59:34.783" v="76" actId="20577"/>
+        <pc:spChg chg="del mod">
+          <ac:chgData name="Knop, Roger" userId="6e18df92-ca78-483d-9f5e-e7e1767bd246" providerId="ADAL" clId="{EE105636-491D-40CE-9D33-638D2C6FE6D6}" dt="2019-10-15T09:34:21.917" v="149" actId="478"/>
+          <ac:spMkLst>
+            <pc:docMk/>
+            <pc:sldMk cId="867983266" sldId="258"/>
+            <ac:spMk id="3" creationId="{9E66EE1B-29ED-45D3-B494-14ECD1A0B694}"/>
+          </ac:spMkLst>
+        </pc:spChg>
+        <pc:spChg chg="mod">
+          <ac:chgData name="Knop, Roger" userId="6e18df92-ca78-483d-9f5e-e7e1767bd246" providerId="ADAL" clId="{EE105636-491D-40CE-9D33-638D2C6FE6D6}" dt="2019-10-15T09:32:37.955" v="117" actId="14100"/>
+          <ac:spMkLst>
+            <pc:docMk/>
+            <pc:sldMk cId="867983266" sldId="258"/>
+            <ac:spMk id="62" creationId="{64426494-DB82-48D2-A2B5-0118FD07967B}"/>
+          </ac:spMkLst>
+        </pc:spChg>
+        <pc:spChg chg="mod">
+          <ac:chgData name="Knop, Roger" userId="6e18df92-ca78-483d-9f5e-e7e1767bd246" providerId="ADAL" clId="{EE105636-491D-40CE-9D33-638D2C6FE6D6}" dt="2019-10-15T09:33:13.487" v="139" actId="20577"/>
+          <ac:spMkLst>
+            <pc:docMk/>
+            <pc:sldMk cId="867983266" sldId="258"/>
+            <ac:spMk id="69" creationId="{82F4AE9D-8D85-4D55-8D79-0912EDCBF10C}"/>
+          </ac:spMkLst>
+        </pc:spChg>
+        <pc:spChg chg="add del mod ord">
+          <ac:chgData name="Knop, Roger" userId="6e18df92-ca78-483d-9f5e-e7e1767bd246" providerId="ADAL" clId="{EE105636-491D-40CE-9D33-638D2C6FE6D6}" dt="2019-10-15T09:32:42.259" v="118" actId="478"/>
           <ac:spMkLst>
             <pc:docMk/>
             <pc:sldMk cId="867983266" sldId="258"/>
             <ac:spMk id="75" creationId="{EDB21D15-EBD0-4897-829A-144C82ED5159}"/>
           </ac:spMkLst>
         </pc:spChg>
+        <pc:spChg chg="mod">
+          <ac:chgData name="Knop, Roger" userId="6e18df92-ca78-483d-9f5e-e7e1767bd246" providerId="ADAL" clId="{EE105636-491D-40CE-9D33-638D2C6FE6D6}" dt="2019-10-15T09:33:58.900" v="146" actId="1076"/>
+          <ac:spMkLst>
+            <pc:docMk/>
+            <pc:sldMk cId="867983266" sldId="258"/>
+            <ac:spMk id="103" creationId="{22D8A4AD-3BF4-4E25-A56F-8826FCD94348}"/>
+          </ac:spMkLst>
+        </pc:spChg>
+        <pc:grpChg chg="mod">
+          <ac:chgData name="Knop, Roger" userId="6e18df92-ca78-483d-9f5e-e7e1767bd246" providerId="ADAL" clId="{EE105636-491D-40CE-9D33-638D2C6FE6D6}" dt="2019-10-15T09:34:12.859" v="148" actId="1076"/>
+          <ac:grpSpMkLst>
+            <pc:docMk/>
+            <pc:sldMk cId="867983266" sldId="258"/>
+            <ac:grpSpMk id="63" creationId="{A970E67F-4295-4D26-B5BD-761567807F28}"/>
+          </ac:grpSpMkLst>
+        </pc:grpChg>
+        <pc:picChg chg="mod">
+          <ac:chgData name="Knop, Roger" userId="6e18df92-ca78-483d-9f5e-e7e1767bd246" providerId="ADAL" clId="{EE105636-491D-40CE-9D33-638D2C6FE6D6}" dt="2019-10-15T09:34:12.859" v="148" actId="1076"/>
+          <ac:picMkLst>
+            <pc:docMk/>
+            <pc:sldMk cId="867983266" sldId="258"/>
+            <ac:picMk id="70" creationId="{234043ED-8654-4348-A034-74A9D5135D44}"/>
+          </ac:picMkLst>
+        </pc:picChg>
+        <pc:cxnChg chg="mod">
+          <ac:chgData name="Knop, Roger" userId="6e18df92-ca78-483d-9f5e-e7e1767bd246" providerId="ADAL" clId="{EE105636-491D-40CE-9D33-638D2C6FE6D6}" dt="2019-10-15T09:33:58.900" v="146" actId="1076"/>
+          <ac:cxnSpMkLst>
+            <pc:docMk/>
+            <pc:sldMk cId="867983266" sldId="258"/>
+            <ac:cxnSpMk id="7" creationId="{2F312F9A-1E61-48DE-8FFC-276B374911D9}"/>
+          </ac:cxnSpMkLst>
+        </pc:cxnChg>
+        <pc:cxnChg chg="mod">
+          <ac:chgData name="Knop, Roger" userId="6e18df92-ca78-483d-9f5e-e7e1767bd246" providerId="ADAL" clId="{EE105636-491D-40CE-9D33-638D2C6FE6D6}" dt="2019-10-15T09:32:37.955" v="117" actId="14100"/>
+          <ac:cxnSpMkLst>
+            <pc:docMk/>
+            <pc:sldMk cId="867983266" sldId="258"/>
+            <ac:cxnSpMk id="40" creationId="{CF28C14C-B174-402C-87C6-4D29BDC8BD6B}"/>
+          </ac:cxnSpMkLst>
+        </pc:cxnChg>
+        <pc:cxnChg chg="mod">
+          <ac:chgData name="Knop, Roger" userId="6e18df92-ca78-483d-9f5e-e7e1767bd246" providerId="ADAL" clId="{EE105636-491D-40CE-9D33-638D2C6FE6D6}" dt="2019-10-15T09:33:54.442" v="145" actId="14100"/>
+          <ac:cxnSpMkLst>
+            <pc:docMk/>
+            <pc:sldMk cId="867983266" sldId="258"/>
+            <ac:cxnSpMk id="80" creationId="{16750294-DF37-4EE6-B611-CF5DD86E41CA}"/>
+          </ac:cxnSpMkLst>
+        </pc:cxnChg>
+        <pc:cxnChg chg="mod">
+          <ac:chgData name="Knop, Roger" userId="6e18df92-ca78-483d-9f5e-e7e1767bd246" providerId="ADAL" clId="{EE105636-491D-40CE-9D33-638D2C6FE6D6}" dt="2019-10-15T09:34:28.868" v="150" actId="14100"/>
+          <ac:cxnSpMkLst>
+            <pc:docMk/>
+            <pc:sldMk cId="867983266" sldId="258"/>
+            <ac:cxnSpMk id="81" creationId="{203F1856-DA26-47D6-BF5A-BFE65A68CE37}"/>
+          </ac:cxnSpMkLst>
+        </pc:cxnChg>
+        <pc:cxnChg chg="mod">
+          <ac:chgData name="Knop, Roger" userId="6e18df92-ca78-483d-9f5e-e7e1767bd246" providerId="ADAL" clId="{EE105636-491D-40CE-9D33-638D2C6FE6D6}" dt="2019-10-15T09:32:37.955" v="117" actId="14100"/>
+          <ac:cxnSpMkLst>
+            <pc:docMk/>
+            <pc:sldMk cId="867983266" sldId="258"/>
+            <ac:cxnSpMk id="84" creationId="{9ABB9810-0FB2-4FC6-88E7-76B1E35F72DB}"/>
+          </ac:cxnSpMkLst>
+        </pc:cxnChg>
+        <pc:cxnChg chg="mod">
+          <ac:chgData name="Knop, Roger" userId="6e18df92-ca78-483d-9f5e-e7e1767bd246" providerId="ADAL" clId="{EE105636-491D-40CE-9D33-638D2C6FE6D6}" dt="2019-10-15T09:32:37.955" v="117" actId="14100"/>
+          <ac:cxnSpMkLst>
+            <pc:docMk/>
+            <pc:sldMk cId="867983266" sldId="258"/>
+            <ac:cxnSpMk id="85" creationId="{9BF8D462-EC99-4E44-82F3-64FB011E1469}"/>
+          </ac:cxnSpMkLst>
+        </pc:cxnChg>
+        <pc:cxnChg chg="mod">
+          <ac:chgData name="Knop, Roger" userId="6e18df92-ca78-483d-9f5e-e7e1767bd246" providerId="ADAL" clId="{EE105636-491D-40CE-9D33-638D2C6FE6D6}" dt="2019-10-15T09:33:54.442" v="145" actId="14100"/>
+          <ac:cxnSpMkLst>
+            <pc:docMk/>
+            <pc:sldMk cId="867983266" sldId="258"/>
+            <ac:cxnSpMk id="92" creationId="{C82ED433-19E4-425B-B25D-783AB6660D13}"/>
+          </ac:cxnSpMkLst>
+        </pc:cxnChg>
+        <pc:cxnChg chg="mod">
+          <ac:chgData name="Knop, Roger" userId="6e18df92-ca78-483d-9f5e-e7e1767bd246" providerId="ADAL" clId="{EE105636-491D-40CE-9D33-638D2C6FE6D6}" dt="2019-10-15T09:33:58.900" v="146" actId="1076"/>
+          <ac:cxnSpMkLst>
+            <pc:docMk/>
+            <pc:sldMk cId="867983266" sldId="258"/>
+            <ac:cxnSpMk id="105" creationId="{2DDE5DE3-4607-4FE8-BE27-D79C6CBA70CA}"/>
+          </ac:cxnSpMkLst>
+        </pc:cxnChg>
       </pc:sldChg>
     </pc:docChg>
   </pc:docChgLst>
@@ -256,7 +368,7 @@
           <a:p>
             <a:fld id="{E679DB1F-D61D-433C-BF0D-19DF96EA831A}" type="datetimeFigureOut">
               <a:rPr lang="de-DE" smtClean="0"/>
-              <a:t>03.10.2019</a:t>
+              <a:t>15.10.2019</a:t>
             </a:fld>
             <a:endParaRPr lang="de-DE"/>
           </a:p>
@@ -1293,7 +1405,7 @@
           <a:p>
             <a:fld id="{89028E9F-3905-4325-8FE4-24BE77D686F8}" type="datetimeFigureOut">
               <a:rPr lang="de-DE" smtClean="0"/>
-              <a:t>03.10.2019</a:t>
+              <a:t>15.10.2019</a:t>
             </a:fld>
             <a:endParaRPr lang="de-DE"/>
           </a:p>
@@ -1493,7 +1605,7 @@
           <a:p>
             <a:fld id="{89028E9F-3905-4325-8FE4-24BE77D686F8}" type="datetimeFigureOut">
               <a:rPr lang="de-DE" smtClean="0"/>
-              <a:t>03.10.2019</a:t>
+              <a:t>15.10.2019</a:t>
             </a:fld>
             <a:endParaRPr lang="de-DE"/>
           </a:p>
@@ -1703,7 +1815,7 @@
           <a:p>
             <a:fld id="{89028E9F-3905-4325-8FE4-24BE77D686F8}" type="datetimeFigureOut">
               <a:rPr lang="de-DE" smtClean="0"/>
-              <a:t>03.10.2019</a:t>
+              <a:t>15.10.2019</a:t>
             </a:fld>
             <a:endParaRPr lang="de-DE"/>
           </a:p>
@@ -1903,7 +2015,7 @@
           <a:p>
             <a:fld id="{89028E9F-3905-4325-8FE4-24BE77D686F8}" type="datetimeFigureOut">
               <a:rPr lang="de-DE" smtClean="0"/>
-              <a:t>03.10.2019</a:t>
+              <a:t>15.10.2019</a:t>
             </a:fld>
             <a:endParaRPr lang="de-DE"/>
           </a:p>
@@ -2179,7 +2291,7 @@
           <a:p>
             <a:fld id="{89028E9F-3905-4325-8FE4-24BE77D686F8}" type="datetimeFigureOut">
               <a:rPr lang="de-DE" smtClean="0"/>
-              <a:t>03.10.2019</a:t>
+              <a:t>15.10.2019</a:t>
             </a:fld>
             <a:endParaRPr lang="de-DE"/>
           </a:p>
@@ -2447,7 +2559,7 @@
           <a:p>
             <a:fld id="{89028E9F-3905-4325-8FE4-24BE77D686F8}" type="datetimeFigureOut">
               <a:rPr lang="de-DE" smtClean="0"/>
-              <a:t>03.10.2019</a:t>
+              <a:t>15.10.2019</a:t>
             </a:fld>
             <a:endParaRPr lang="de-DE"/>
           </a:p>
@@ -2862,7 +2974,7 @@
           <a:p>
             <a:fld id="{89028E9F-3905-4325-8FE4-24BE77D686F8}" type="datetimeFigureOut">
               <a:rPr lang="de-DE" smtClean="0"/>
-              <a:t>03.10.2019</a:t>
+              <a:t>15.10.2019</a:t>
             </a:fld>
             <a:endParaRPr lang="de-DE"/>
           </a:p>
@@ -3004,7 +3116,7 @@
           <a:p>
             <a:fld id="{89028E9F-3905-4325-8FE4-24BE77D686F8}" type="datetimeFigureOut">
               <a:rPr lang="de-DE" smtClean="0"/>
-              <a:t>03.10.2019</a:t>
+              <a:t>15.10.2019</a:t>
             </a:fld>
             <a:endParaRPr lang="de-DE"/>
           </a:p>
@@ -3117,7 +3229,7 @@
           <a:p>
             <a:fld id="{89028E9F-3905-4325-8FE4-24BE77D686F8}" type="datetimeFigureOut">
               <a:rPr lang="de-DE" smtClean="0"/>
-              <a:t>03.10.2019</a:t>
+              <a:t>15.10.2019</a:t>
             </a:fld>
             <a:endParaRPr lang="de-DE"/>
           </a:p>
@@ -3430,7 +3542,7 @@
           <a:p>
             <a:fld id="{89028E9F-3905-4325-8FE4-24BE77D686F8}" type="datetimeFigureOut">
               <a:rPr lang="de-DE" smtClean="0"/>
-              <a:t>03.10.2019</a:t>
+              <a:t>15.10.2019</a:t>
             </a:fld>
             <a:endParaRPr lang="de-DE"/>
           </a:p>
@@ -3719,7 +3831,7 @@
           <a:p>
             <a:fld id="{89028E9F-3905-4325-8FE4-24BE77D686F8}" type="datetimeFigureOut">
               <a:rPr lang="de-DE" smtClean="0"/>
-              <a:t>03.10.2019</a:t>
+              <a:t>15.10.2019</a:t>
             </a:fld>
             <a:endParaRPr lang="de-DE"/>
           </a:p>
@@ -3962,7 +4074,7 @@
           <a:p>
             <a:fld id="{89028E9F-3905-4325-8FE4-24BE77D686F8}" type="datetimeFigureOut">
               <a:rPr lang="de-DE" smtClean="0"/>
-              <a:t>03.10.2019</a:t>
+              <a:t>15.10.2019</a:t>
             </a:fld>
             <a:endParaRPr lang="de-DE"/>
           </a:p>
@@ -7077,7 +7189,7 @@
         <p:spPr>
           <a:xfrm>
             <a:off x="2317141" y="2857291"/>
-            <a:ext cx="0" cy="700816"/>
+            <a:ext cx="0" cy="659468"/>
           </a:xfrm>
           <a:prstGeom prst="straightConnector1">
             <a:avLst/>
@@ -7123,8 +7235,8 @@
         </p:nvSpPr>
         <p:spPr>
           <a:xfrm>
-            <a:off x="1767310" y="3558107"/>
-            <a:ext cx="1099661" cy="527029"/>
+            <a:off x="1767310" y="3516759"/>
+            <a:ext cx="1099661" cy="609726"/>
           </a:xfrm>
           <a:prstGeom prst="roundRect">
             <a:avLst/>
@@ -7172,6 +7284,22 @@
               <a:t> Z21</a:t>
             </a:r>
           </a:p>
+          <a:p>
+            <a:pPr algn="ctr"/>
+            <a:r>
+              <a:rPr lang="de-DE" sz="900" dirty="0">
+                <a:solidFill>
+                  <a:schemeClr val="bg2">
+                    <a:lumMod val="50000"/>
+                  </a:schemeClr>
+                </a:solidFill>
+                <a:highlight>
+                  <a:srgbClr val="00FF00"/>
+                </a:highlight>
+              </a:rPr>
+              <a:t>192.168.1.144 </a:t>
+            </a:r>
+          </a:p>
         </p:txBody>
       </p:sp>
       <p:grpSp>
@@ -7188,8 +7316,8 @@
         </p:nvGrpSpPr>
         <p:grpSpPr>
           <a:xfrm>
-            <a:off x="7388257" y="1917173"/>
-            <a:ext cx="967495" cy="1088461"/>
+            <a:off x="7388257" y="1825745"/>
+            <a:ext cx="967495" cy="1271318"/>
             <a:chOff x="9090905" y="4721073"/>
             <a:chExt cx="967495" cy="1088461"/>
           </a:xfrm>
@@ -7264,6 +7392,36 @@
                 <a:rPr lang="de-DE" sz="1000" dirty="0" err="1"/>
                 <a:t>RocNetNode</a:t>
               </a:r>
+              <a:endParaRPr lang="de-DE" sz="1000" dirty="0"/>
+            </a:p>
+            <a:p>
+              <a:pPr algn="ctr"/>
+              <a:r>
+                <a:rPr lang="de-DE" sz="900" dirty="0" err="1">
+                  <a:solidFill>
+                    <a:schemeClr val="bg2">
+                      <a:lumMod val="50000"/>
+                    </a:schemeClr>
+                  </a:solidFill>
+                  <a:highlight>
+                    <a:srgbClr val="00FF00"/>
+                  </a:highlight>
+                </a:rPr>
+                <a:t>railrocpi</a:t>
+              </a:r>
+              <a:r>
+                <a:rPr lang="de-DE" sz="900" dirty="0">
+                  <a:solidFill>
+                    <a:schemeClr val="bg2">
+                      <a:lumMod val="50000"/>
+                    </a:schemeClr>
+                  </a:solidFill>
+                  <a:highlight>
+                    <a:srgbClr val="00FF00"/>
+                  </a:highlight>
+                </a:rPr>
+                <a:t> 192.168.1.140</a:t>
+              </a:r>
               <a:endParaRPr lang="de-DE" sz="900" dirty="0"/>
             </a:p>
           </p:txBody>
@@ -7297,8 +7455,8 @@
           </p:blipFill>
           <p:spPr bwMode="auto">
             <a:xfrm>
-              <a:off x="9387227" y="4784678"/>
-              <a:ext cx="374850" cy="446250"/>
+              <a:off x="9421797" y="4747462"/>
+              <a:ext cx="278625" cy="331696"/>
             </a:xfrm>
             <a:prstGeom prst="rect">
               <a:avLst/>
@@ -7579,8 +7737,8 @@
         </p:nvCxnSpPr>
         <p:spPr>
           <a:xfrm flipH="1" flipV="1">
-            <a:off x="2317141" y="4085136"/>
-            <a:ext cx="3817" cy="722578"/>
+            <a:off x="2317141" y="4126485"/>
+            <a:ext cx="3817" cy="681229"/>
           </a:xfrm>
           <a:prstGeom prst="straightConnector1">
             <a:avLst/>
@@ -7894,7 +8052,7 @@
         </p:nvSpPr>
         <p:spPr>
           <a:xfrm>
-            <a:off x="7388257" y="2999770"/>
+            <a:off x="7388257" y="3088168"/>
             <a:ext cx="967496" cy="361951"/>
           </a:xfrm>
           <a:prstGeom prst="roundRect">
@@ -7953,8 +8111,8 @@
         </p:nvCxnSpPr>
         <p:spPr>
           <a:xfrm flipH="1">
-            <a:off x="7872004" y="3361721"/>
-            <a:ext cx="1" cy="997765"/>
+            <a:off x="7872004" y="3450119"/>
+            <a:ext cx="1" cy="909367"/>
           </a:xfrm>
           <a:prstGeom prst="straightConnector1">
             <a:avLst/>
@@ -8540,8 +8698,8 @@
         </p:nvCxnSpPr>
         <p:spPr>
           <a:xfrm rot="10800000" flipV="1">
-            <a:off x="5476683" y="3180746"/>
-            <a:ext cx="1911575" cy="903728"/>
+            <a:off x="5476683" y="3269144"/>
+            <a:ext cx="1911575" cy="815330"/>
           </a:xfrm>
           <a:prstGeom prst="bentConnector2">
             <a:avLst/>
@@ -9238,7 +9396,7 @@
         <p:spPr>
           <a:xfrm>
             <a:off x="7867725" y="1654692"/>
-            <a:ext cx="4280" cy="262481"/>
+            <a:ext cx="4280" cy="171053"/>
           </a:xfrm>
           <a:prstGeom prst="straightConnector1">
             <a:avLst/>
@@ -9282,14 +9440,14 @@
           <p:cNvCxnSpPr>
             <a:cxnSpLocks/>
             <a:stCxn id="73" idx="1"/>
-            <a:endCxn id="1026" idx="0"/>
+            <a:endCxn id="78" idx="0"/>
           </p:cNvCxnSpPr>
           <p:nvPr/>
         </p:nvCxnSpPr>
         <p:spPr>
           <a:xfrm rot="10800000" flipV="1">
-            <a:off x="2322911" y="1530230"/>
-            <a:ext cx="851700" cy="557049"/>
+            <a:off x="2317141" y="1530231"/>
+            <a:ext cx="857470" cy="538144"/>
           </a:xfrm>
           <a:prstGeom prst="bentConnector2">
             <a:avLst/>
@@ -9704,108 +9862,6 @@
                 <a:schemeClr val="tx1"/>
               </a:solidFill>
             </a:endParaRPr>
-          </a:p>
-        </p:txBody>
-      </p:sp>
-      <p:sp>
-        <p:nvSpPr>
-          <p:cNvPr id="3" name="Rectangle 2">
-            <a:extLst>
-              <a:ext uri="{FF2B5EF4-FFF2-40B4-BE49-F238E27FC236}">
-                <a16:creationId xmlns:a16="http://schemas.microsoft.com/office/drawing/2014/main" id="{9E66EE1B-29ED-45D3-B494-14ECD1A0B694}"/>
-              </a:ext>
-            </a:extLst>
-          </p:cNvPr>
-          <p:cNvSpPr/>
-          <p:nvPr/>
-        </p:nvSpPr>
-        <p:spPr>
-          <a:xfrm>
-            <a:off x="8143751" y="2014086"/>
-            <a:ext cx="1725339" cy="247679"/>
-          </a:xfrm>
-          <a:prstGeom prst="rect">
-            <a:avLst/>
-          </a:prstGeom>
-        </p:spPr>
-        <p:style>
-          <a:lnRef idx="2">
-            <a:schemeClr val="accent4">
-              <a:shade val="50000"/>
-            </a:schemeClr>
-          </a:lnRef>
-          <a:fillRef idx="1">
-            <a:schemeClr val="accent4"/>
-          </a:fillRef>
-          <a:effectRef idx="0">
-            <a:schemeClr val="accent4"/>
-          </a:effectRef>
-          <a:fontRef idx="minor">
-            <a:schemeClr val="lt1"/>
-          </a:fontRef>
-        </p:style>
-        <p:txBody>
-          <a:bodyPr rtlCol="0" anchor="ctr"/>
-          <a:lstStyle/>
-          <a:p>
-            <a:pPr algn="ctr"/>
-            <a:r>
-              <a:rPr lang="de-DE" sz="1200" dirty="0" err="1"/>
-              <a:t>railrocpi</a:t>
-            </a:r>
-            <a:r>
-              <a:rPr lang="de-DE" sz="1200" dirty="0"/>
-              <a:t> 192.168.1.140</a:t>
-            </a:r>
-          </a:p>
-        </p:txBody>
-      </p:sp>
-      <p:sp>
-        <p:nvSpPr>
-          <p:cNvPr id="75" name="Rectangle 74">
-            <a:extLst>
-              <a:ext uri="{FF2B5EF4-FFF2-40B4-BE49-F238E27FC236}">
-                <a16:creationId xmlns:a16="http://schemas.microsoft.com/office/drawing/2014/main" id="{EDB21D15-EBD0-4897-829A-144C82ED5159}"/>
-              </a:ext>
-            </a:extLst>
-          </p:cNvPr>
-          <p:cNvSpPr/>
-          <p:nvPr/>
-        </p:nvSpPr>
-        <p:spPr>
-          <a:xfrm>
-            <a:off x="2370211" y="3351776"/>
-            <a:ext cx="1725339" cy="247679"/>
-          </a:xfrm>
-          <a:prstGeom prst="rect">
-            <a:avLst/>
-          </a:prstGeom>
-        </p:spPr>
-        <p:style>
-          <a:lnRef idx="2">
-            <a:schemeClr val="accent4">
-              <a:shade val="50000"/>
-            </a:schemeClr>
-          </a:lnRef>
-          <a:fillRef idx="1">
-            <a:schemeClr val="accent4"/>
-          </a:fillRef>
-          <a:effectRef idx="0">
-            <a:schemeClr val="accent4"/>
-          </a:effectRef>
-          <a:fontRef idx="minor">
-            <a:schemeClr val="lt1"/>
-          </a:fontRef>
-        </p:style>
-        <p:txBody>
-          <a:bodyPr rtlCol="0" anchor="ctr"/>
-          <a:lstStyle/>
-          <a:p>
-            <a:pPr algn="ctr"/>
-            <a:r>
-              <a:rPr lang="de-DE" sz="1200" dirty="0"/>
-              <a:t>??? 192.168.1.???</a:t>
-            </a:r>
           </a:p>
         </p:txBody>
       </p:sp>

</xml_diff>

<commit_message>
Config mit default und local erstellt
</commit_message>
<xml_diff>
--- a/oriDocs/Architektur.pptx
+++ b/oriDocs/Architektur.pptx
@@ -5,11 +5,10 @@
     <p:sldMasterId id="2147483648" r:id="rId1"/>
   </p:sldMasterIdLst>
   <p:notesMasterIdLst>
-    <p:notesMasterId r:id="rId4"/>
+    <p:notesMasterId r:id="rId3"/>
   </p:notesMasterIdLst>
   <p:sldIdLst>
     <p:sldId id="257" r:id="rId2"/>
-    <p:sldId id="258" r:id="rId3"/>
   </p:sldIdLst>
   <p:sldSz cx="12192000" cy="6858000"/>
   <p:notesSz cx="6858000" cy="9144000"/>
@@ -368,7 +367,7 @@
           <a:p>
             <a:fld id="{E679DB1F-D61D-433C-BF0D-19DF96EA831A}" type="datetimeFigureOut">
               <a:rPr lang="de-DE" smtClean="0"/>
-              <a:t>15.10.2019</a:t>
+              <a:t>22.10.2019</a:t>
             </a:fld>
             <a:endParaRPr lang="de-DE"/>
           </a:p>
@@ -946,316 +945,6 @@
 </p:notes>
 </file>
 
-<file path=ppt/notesSlides/notesSlide2.xml><?xml version="1.0" encoding="utf-8"?>
-<p:notes xmlns:a="http://schemas.openxmlformats.org/drawingml/2006/main" xmlns:r="http://schemas.openxmlformats.org/officeDocument/2006/relationships" xmlns:p="http://schemas.openxmlformats.org/presentationml/2006/main">
-  <p:cSld>
-    <p:spTree>
-      <p:nvGrpSpPr>
-        <p:cNvPr id="1" name=""/>
-        <p:cNvGrpSpPr/>
-        <p:nvPr/>
-      </p:nvGrpSpPr>
-      <p:grpSpPr>
-        <a:xfrm>
-          <a:off x="0" y="0"/>
-          <a:ext cx="0" cy="0"/>
-          <a:chOff x="0" y="0"/>
-          <a:chExt cx="0" cy="0"/>
-        </a:xfrm>
-      </p:grpSpPr>
-      <p:sp>
-        <p:nvSpPr>
-          <p:cNvPr id="2" name="Slide Image Placeholder 1"/>
-          <p:cNvSpPr>
-            <a:spLocks noGrp="1" noRot="1" noChangeAspect="1"/>
-          </p:cNvSpPr>
-          <p:nvPr>
-            <p:ph type="sldImg"/>
-          </p:nvPr>
-        </p:nvSpPr>
-        <p:spPr/>
-      </p:sp>
-      <p:sp>
-        <p:nvSpPr>
-          <p:cNvPr id="3" name="Notes Placeholder 2"/>
-          <p:cNvSpPr>
-            <a:spLocks noGrp="1"/>
-          </p:cNvSpPr>
-          <p:nvPr>
-            <p:ph type="body" idx="1"/>
-          </p:nvPr>
-        </p:nvSpPr>
-        <p:spPr/>
-        <p:txBody>
-          <a:bodyPr/>
-          <a:lstStyle/>
-          <a:p>
-            <a:r>
-              <a:rPr lang="de-DE" dirty="0"/>
-              <a:t>Pi01 – 11,90</a:t>
-            </a:r>
-          </a:p>
-          <a:p>
-            <a:endParaRPr lang="de-DE" dirty="0"/>
-          </a:p>
-          <a:p>
-            <a:r>
-              <a:rPr lang="de-DE" dirty="0"/>
-              <a:t>Pi02 – 32,50</a:t>
-            </a:r>
-          </a:p>
-          <a:p>
-            <a:r>
-              <a:rPr lang="de-DE" dirty="0"/>
-              <a:t>32 IO</a:t>
-            </a:r>
-          </a:p>
-          <a:p>
-            <a:pPr marL="0" marR="0" lvl="0" indent="0" algn="l" defTabSz="914400" rtl="0" eaLnBrk="1" fontAlgn="auto" latinLnBrk="0" hangingPunct="1">
-              <a:lnSpc>
-                <a:spcPct val="100000"/>
-              </a:lnSpc>
-              <a:spcBef>
-                <a:spcPts val="0"/>
-              </a:spcBef>
-              <a:spcAft>
-                <a:spcPts val="0"/>
-              </a:spcAft>
-              <a:buClrTx/>
-              <a:buSzTx/>
-              <a:buFontTx/>
-              <a:buNone/>
-              <a:tabLst/>
-              <a:defRPr/>
-            </a:pPr>
-            <a:r>
-              <a:rPr lang="de-DE" dirty="0"/>
-              <a:t>Bis 4 pro </a:t>
-            </a:r>
-            <a:r>
-              <a:rPr lang="de-DE" dirty="0" err="1"/>
-              <a:t>Raspi</a:t>
-            </a:r>
-            <a:endParaRPr lang="de-DE" dirty="0"/>
-          </a:p>
-          <a:p>
-            <a:endParaRPr lang="de-DE" dirty="0"/>
-          </a:p>
-          <a:p>
-            <a:r>
-              <a:rPr lang="de-DE" dirty="0"/>
-              <a:t>Pi03 – 23,75</a:t>
-            </a:r>
-          </a:p>
-          <a:p>
-            <a:r>
-              <a:rPr lang="de-DE" dirty="0"/>
-              <a:t>8x </a:t>
-            </a:r>
-            <a:r>
-              <a:rPr lang="de-DE" dirty="0" err="1"/>
-              <a:t>Servo</a:t>
-            </a:r>
-            <a:endParaRPr lang="de-DE" dirty="0"/>
-          </a:p>
-          <a:p>
-            <a:pPr marL="0" marR="0" lvl="0" indent="0" algn="l" defTabSz="914400" rtl="0" eaLnBrk="1" fontAlgn="auto" latinLnBrk="0" hangingPunct="1">
-              <a:lnSpc>
-                <a:spcPct val="100000"/>
-              </a:lnSpc>
-              <a:spcBef>
-                <a:spcPts val="0"/>
-              </a:spcBef>
-              <a:spcAft>
-                <a:spcPts val="0"/>
-              </a:spcAft>
-              <a:buClrTx/>
-              <a:buSzTx/>
-              <a:buFontTx/>
-              <a:buNone/>
-              <a:tabLst/>
-              <a:defRPr/>
-            </a:pPr>
-            <a:r>
-              <a:rPr lang="de-DE" dirty="0"/>
-              <a:t>Bis 4 pro </a:t>
-            </a:r>
-            <a:r>
-              <a:rPr lang="de-DE" dirty="0" err="1"/>
-              <a:t>Raspi</a:t>
-            </a:r>
-            <a:endParaRPr lang="de-DE" dirty="0"/>
-          </a:p>
-          <a:p>
-            <a:pPr marL="0" marR="0" lvl="0" indent="0" algn="l" defTabSz="914400" rtl="0" eaLnBrk="1" fontAlgn="auto" latinLnBrk="0" hangingPunct="1">
-              <a:lnSpc>
-                <a:spcPct val="100000"/>
-              </a:lnSpc>
-              <a:spcBef>
-                <a:spcPts val="0"/>
-              </a:spcBef>
-              <a:spcAft>
-                <a:spcPts val="0"/>
-              </a:spcAft>
-              <a:buClrTx/>
-              <a:buSzTx/>
-              <a:buFontTx/>
-              <a:buNone/>
-              <a:tabLst/>
-              <a:defRPr/>
-            </a:pPr>
-            <a:r>
-              <a:rPr lang="de-DE" dirty="0"/>
-              <a:t>(1) Mit oder ohne </a:t>
-            </a:r>
-            <a:r>
-              <a:rPr lang="de-DE" sz="1200" b="0" i="0" kern="1200" dirty="0">
-                <a:solidFill>
-                  <a:schemeClr val="tx1"/>
-                </a:solidFill>
-                <a:effectLst/>
-                <a:latin typeface="+mn-lt"/>
-                <a:ea typeface="+mn-ea"/>
-                <a:cs typeface="+mn-cs"/>
-              </a:rPr>
-              <a:t>PCA9685???</a:t>
-            </a:r>
-            <a:endParaRPr lang="de-DE" dirty="0"/>
-          </a:p>
-          <a:p>
-            <a:endParaRPr lang="de-DE" dirty="0"/>
-          </a:p>
-          <a:p>
-            <a:r>
-              <a:rPr lang="de-DE" dirty="0"/>
-              <a:t>Pi06 – 18,75</a:t>
-            </a:r>
-          </a:p>
-          <a:p>
-            <a:r>
-              <a:rPr lang="de-DE" dirty="0"/>
-              <a:t>Stromversorgung</a:t>
-            </a:r>
-          </a:p>
-          <a:p>
-            <a:r>
-              <a:rPr lang="de-DE" dirty="0"/>
-              <a:t>Auch für den </a:t>
-            </a:r>
-            <a:r>
-              <a:rPr lang="de-DE" dirty="0" err="1"/>
-              <a:t>Raspi</a:t>
-            </a:r>
-            <a:r>
-              <a:rPr lang="de-DE" dirty="0"/>
-              <a:t>, daher braucht er kein Netzteil</a:t>
-            </a:r>
-          </a:p>
-          <a:p>
-            <a:endParaRPr lang="de-DE" dirty="0"/>
-          </a:p>
-          <a:p>
-            <a:r>
-              <a:rPr lang="de-DE" dirty="0"/>
-              <a:t>GCA93 – 27,50</a:t>
-            </a:r>
-          </a:p>
-          <a:p>
-            <a:r>
-              <a:rPr lang="de-DE" dirty="0"/>
-              <a:t>8x Gleisbesetztmelder</a:t>
-            </a:r>
-          </a:p>
-          <a:p>
-            <a:endParaRPr lang="de-DE" dirty="0"/>
-          </a:p>
-          <a:p>
-            <a:r>
-              <a:rPr lang="de-DE" dirty="0"/>
-              <a:t>GCA173 – 19,00</a:t>
-            </a:r>
-          </a:p>
-          <a:p>
-            <a:r>
-              <a:rPr lang="de-DE" dirty="0"/>
-              <a:t>8x </a:t>
-            </a:r>
-            <a:r>
-              <a:rPr lang="de-DE"/>
-              <a:t>Gleisbesetztmelder Hallsensor</a:t>
-            </a:r>
-            <a:endParaRPr lang="de-DE" dirty="0"/>
-          </a:p>
-          <a:p>
-            <a:endParaRPr lang="de-DE" dirty="0"/>
-          </a:p>
-          <a:p>
-            <a:r>
-              <a:rPr lang="de-DE" dirty="0"/>
-              <a:t>Pi07 – 47,50</a:t>
-            </a:r>
-          </a:p>
-          <a:p>
-            <a:r>
-              <a:rPr lang="de-DE" dirty="0"/>
-              <a:t>Zu teuer – braucht man nicht</a:t>
-            </a:r>
-          </a:p>
-          <a:p>
-            <a:r>
-              <a:rPr lang="de-DE" dirty="0"/>
-              <a:t>8x Gleisbesetztmelder</a:t>
-            </a:r>
-          </a:p>
-          <a:p>
-            <a:r>
-              <a:rPr lang="de-DE" dirty="0"/>
-              <a:t>Bis 4 pro </a:t>
-            </a:r>
-            <a:r>
-              <a:rPr lang="de-DE" dirty="0" err="1"/>
-              <a:t>Raspi</a:t>
-            </a:r>
-            <a:endParaRPr lang="de-DE" dirty="0"/>
-          </a:p>
-        </p:txBody>
-      </p:sp>
-      <p:sp>
-        <p:nvSpPr>
-          <p:cNvPr id="4" name="Slide Number Placeholder 3"/>
-          <p:cNvSpPr>
-            <a:spLocks noGrp="1"/>
-          </p:cNvSpPr>
-          <p:nvPr>
-            <p:ph type="sldNum" sz="quarter" idx="5"/>
-          </p:nvPr>
-        </p:nvSpPr>
-        <p:spPr/>
-        <p:txBody>
-          <a:bodyPr/>
-          <a:lstStyle/>
-          <a:p>
-            <a:fld id="{070F5E1C-2C2E-49F0-8985-30232DCC0ECA}" type="slidenum">
-              <a:rPr lang="de-DE" smtClean="0"/>
-              <a:t>2</a:t>
-            </a:fld>
-            <a:endParaRPr lang="de-DE"/>
-          </a:p>
-        </p:txBody>
-      </p:sp>
-    </p:spTree>
-    <p:extLst>
-      <p:ext uri="{BB962C8B-B14F-4D97-AF65-F5344CB8AC3E}">
-        <p14:creationId xmlns:p14="http://schemas.microsoft.com/office/powerpoint/2010/main" val="414385616"/>
-      </p:ext>
-    </p:extLst>
-  </p:cSld>
-  <p:clrMapOvr>
-    <a:masterClrMapping/>
-  </p:clrMapOvr>
-</p:notes>
-</file>
-
 <file path=ppt/slideLayouts/slideLayout1.xml><?xml version="1.0" encoding="utf-8"?>
 <p:sldLayout xmlns:a="http://schemas.openxmlformats.org/drawingml/2006/main" xmlns:r="http://schemas.openxmlformats.org/officeDocument/2006/relationships" xmlns:p="http://schemas.openxmlformats.org/presentationml/2006/main" type="title" preserve="1">
   <p:cSld name="Title Slide">
@@ -1405,7 +1094,7 @@
           <a:p>
             <a:fld id="{89028E9F-3905-4325-8FE4-24BE77D686F8}" type="datetimeFigureOut">
               <a:rPr lang="de-DE" smtClean="0"/>
-              <a:t>15.10.2019</a:t>
+              <a:t>22.10.2019</a:t>
             </a:fld>
             <a:endParaRPr lang="de-DE"/>
           </a:p>
@@ -1605,7 +1294,7 @@
           <a:p>
             <a:fld id="{89028E9F-3905-4325-8FE4-24BE77D686F8}" type="datetimeFigureOut">
               <a:rPr lang="de-DE" smtClean="0"/>
-              <a:t>15.10.2019</a:t>
+              <a:t>22.10.2019</a:t>
             </a:fld>
             <a:endParaRPr lang="de-DE"/>
           </a:p>
@@ -1815,7 +1504,7 @@
           <a:p>
             <a:fld id="{89028E9F-3905-4325-8FE4-24BE77D686F8}" type="datetimeFigureOut">
               <a:rPr lang="de-DE" smtClean="0"/>
-              <a:t>15.10.2019</a:t>
+              <a:t>22.10.2019</a:t>
             </a:fld>
             <a:endParaRPr lang="de-DE"/>
           </a:p>
@@ -2015,7 +1704,7 @@
           <a:p>
             <a:fld id="{89028E9F-3905-4325-8FE4-24BE77D686F8}" type="datetimeFigureOut">
               <a:rPr lang="de-DE" smtClean="0"/>
-              <a:t>15.10.2019</a:t>
+              <a:t>22.10.2019</a:t>
             </a:fld>
             <a:endParaRPr lang="de-DE"/>
           </a:p>
@@ -2291,7 +1980,7 @@
           <a:p>
             <a:fld id="{89028E9F-3905-4325-8FE4-24BE77D686F8}" type="datetimeFigureOut">
               <a:rPr lang="de-DE" smtClean="0"/>
-              <a:t>15.10.2019</a:t>
+              <a:t>22.10.2019</a:t>
             </a:fld>
             <a:endParaRPr lang="de-DE"/>
           </a:p>
@@ -2559,7 +2248,7 @@
           <a:p>
             <a:fld id="{89028E9F-3905-4325-8FE4-24BE77D686F8}" type="datetimeFigureOut">
               <a:rPr lang="de-DE" smtClean="0"/>
-              <a:t>15.10.2019</a:t>
+              <a:t>22.10.2019</a:t>
             </a:fld>
             <a:endParaRPr lang="de-DE"/>
           </a:p>
@@ -2974,7 +2663,7 @@
           <a:p>
             <a:fld id="{89028E9F-3905-4325-8FE4-24BE77D686F8}" type="datetimeFigureOut">
               <a:rPr lang="de-DE" smtClean="0"/>
-              <a:t>15.10.2019</a:t>
+              <a:t>22.10.2019</a:t>
             </a:fld>
             <a:endParaRPr lang="de-DE"/>
           </a:p>
@@ -3116,7 +2805,7 @@
           <a:p>
             <a:fld id="{89028E9F-3905-4325-8FE4-24BE77D686F8}" type="datetimeFigureOut">
               <a:rPr lang="de-DE" smtClean="0"/>
-              <a:t>15.10.2019</a:t>
+              <a:t>22.10.2019</a:t>
             </a:fld>
             <a:endParaRPr lang="de-DE"/>
           </a:p>
@@ -3229,7 +2918,7 @@
           <a:p>
             <a:fld id="{89028E9F-3905-4325-8FE4-24BE77D686F8}" type="datetimeFigureOut">
               <a:rPr lang="de-DE" smtClean="0"/>
-              <a:t>15.10.2019</a:t>
+              <a:t>22.10.2019</a:t>
             </a:fld>
             <a:endParaRPr lang="de-DE"/>
           </a:p>
@@ -3542,7 +3231,7 @@
           <a:p>
             <a:fld id="{89028E9F-3905-4325-8FE4-24BE77D686F8}" type="datetimeFigureOut">
               <a:rPr lang="de-DE" smtClean="0"/>
-              <a:t>15.10.2019</a:t>
+              <a:t>22.10.2019</a:t>
             </a:fld>
             <a:endParaRPr lang="de-DE"/>
           </a:p>
@@ -3831,7 +3520,7 @@
           <a:p>
             <a:fld id="{89028E9F-3905-4325-8FE4-24BE77D686F8}" type="datetimeFigureOut">
               <a:rPr lang="de-DE" smtClean="0"/>
-              <a:t>15.10.2019</a:t>
+              <a:t>22.10.2019</a:t>
             </a:fld>
             <a:endParaRPr lang="de-DE"/>
           </a:p>
@@ -4074,7 +3763,7 @@
           <a:p>
             <a:fld id="{89028E9F-3905-4325-8FE4-24BE77D686F8}" type="datetimeFigureOut">
               <a:rPr lang="de-DE" smtClean="0"/>
-              <a:t>15.10.2019</a:t>
+              <a:t>22.10.2019</a:t>
             </a:fld>
             <a:endParaRPr lang="de-DE"/>
           </a:p>
@@ -7144,2731 +6833,6 @@
     <p:extLst>
       <p:ext uri="{BB962C8B-B14F-4D97-AF65-F5344CB8AC3E}">
         <p14:creationId xmlns:p14="http://schemas.microsoft.com/office/powerpoint/2010/main" val="4221775841"/>
-      </p:ext>
-    </p:extLst>
-  </p:cSld>
-  <p:clrMapOvr>
-    <a:masterClrMapping/>
-  </p:clrMapOvr>
-</p:sld>
-</file>
-
-<file path=ppt/slides/slide2.xml><?xml version="1.0" encoding="utf-8"?>
-<p:sld xmlns:a="http://schemas.openxmlformats.org/drawingml/2006/main" xmlns:r="http://schemas.openxmlformats.org/officeDocument/2006/relationships" xmlns:p="http://schemas.openxmlformats.org/presentationml/2006/main">
-  <p:cSld>
-    <p:spTree>
-      <p:nvGrpSpPr>
-        <p:cNvPr id="1" name=""/>
-        <p:cNvGrpSpPr/>
-        <p:nvPr/>
-      </p:nvGrpSpPr>
-      <p:grpSpPr>
-        <a:xfrm>
-          <a:off x="0" y="0"/>
-          <a:ext cx="0" cy="0"/>
-          <a:chOff x="0" y="0"/>
-          <a:chExt cx="0" cy="0"/>
-        </a:xfrm>
-      </p:grpSpPr>
-      <p:cxnSp>
-        <p:nvCxnSpPr>
-          <p:cNvPr id="40" name="Straight Arrow Connector 39">
-            <a:extLst>
-              <a:ext uri="{FF2B5EF4-FFF2-40B4-BE49-F238E27FC236}">
-                <a16:creationId xmlns:a16="http://schemas.microsoft.com/office/drawing/2014/main" id="{CF28C14C-B174-402C-87C6-4D29BDC8BD6B}"/>
-              </a:ext>
-            </a:extLst>
-          </p:cNvPr>
-          <p:cNvCxnSpPr>
-            <a:cxnSpLocks/>
-            <a:stCxn id="78" idx="2"/>
-            <a:endCxn id="62" idx="0"/>
-          </p:cNvCxnSpPr>
-          <p:nvPr/>
-        </p:nvCxnSpPr>
-        <p:spPr>
-          <a:xfrm>
-            <a:off x="2317141" y="2857291"/>
-            <a:ext cx="0" cy="659468"/>
-          </a:xfrm>
-          <a:prstGeom prst="straightConnector1">
-            <a:avLst/>
-          </a:prstGeom>
-          <a:ln w="19050" cap="rnd" cmpd="sng">
-            <a:solidFill>
-              <a:schemeClr val="tx1">
-                <a:lumMod val="50000"/>
-                <a:lumOff val="50000"/>
-              </a:schemeClr>
-            </a:solidFill>
-            <a:miter lim="800000"/>
-            <a:headEnd type="none" w="med" len="med"/>
-            <a:tailEnd type="none" w="med" len="med"/>
-          </a:ln>
-        </p:spPr>
-        <p:style>
-          <a:lnRef idx="1">
-            <a:schemeClr val="accent1"/>
-          </a:lnRef>
-          <a:fillRef idx="0">
-            <a:schemeClr val="accent1"/>
-          </a:fillRef>
-          <a:effectRef idx="0">
-            <a:schemeClr val="accent1"/>
-          </a:effectRef>
-          <a:fontRef idx="minor">
-            <a:schemeClr val="tx1"/>
-          </a:fontRef>
-        </p:style>
-      </p:cxnSp>
-      <p:sp>
-        <p:nvSpPr>
-          <p:cNvPr id="62" name="Rectangle: Rounded Corners 61">
-            <a:extLst>
-              <a:ext uri="{FF2B5EF4-FFF2-40B4-BE49-F238E27FC236}">
-                <a16:creationId xmlns:a16="http://schemas.microsoft.com/office/drawing/2014/main" id="{64426494-DB82-48D2-A2B5-0118FD07967B}"/>
-              </a:ext>
-            </a:extLst>
-          </p:cNvPr>
-          <p:cNvSpPr/>
-          <p:nvPr/>
-        </p:nvSpPr>
-        <p:spPr>
-          <a:xfrm>
-            <a:off x="1767310" y="3516759"/>
-            <a:ext cx="1099661" cy="609726"/>
-          </a:xfrm>
-          <a:prstGeom prst="roundRect">
-            <a:avLst/>
-          </a:prstGeom>
-          <a:ln>
-            <a:solidFill>
-              <a:schemeClr val="bg1">
-                <a:lumMod val="50000"/>
-              </a:schemeClr>
-            </a:solidFill>
-          </a:ln>
-        </p:spPr>
-        <p:style>
-          <a:lnRef idx="3">
-            <a:schemeClr val="lt1"/>
-          </a:lnRef>
-          <a:fillRef idx="1">
-            <a:schemeClr val="accent3"/>
-          </a:fillRef>
-          <a:effectRef idx="1">
-            <a:schemeClr val="accent3"/>
-          </a:effectRef>
-          <a:fontRef idx="minor">
-            <a:schemeClr val="lt1"/>
-          </a:fontRef>
-        </p:style>
-        <p:txBody>
-          <a:bodyPr rtlCol="0" anchor="ctr"/>
-          <a:lstStyle/>
-          <a:p>
-            <a:pPr algn="ctr"/>
-            <a:r>
-              <a:rPr lang="de-DE" sz="1400" dirty="0"/>
-              <a:t>Zentrale</a:t>
-            </a:r>
-          </a:p>
-          <a:p>
-            <a:pPr algn="ctr"/>
-            <a:r>
-              <a:rPr lang="de-DE" sz="1400" b="1" dirty="0" err="1"/>
-              <a:t>Roco</a:t>
-            </a:r>
-            <a:r>
-              <a:rPr lang="de-DE" sz="1400" b="1" dirty="0"/>
-              <a:t> Z21</a:t>
-            </a:r>
-          </a:p>
-          <a:p>
-            <a:pPr algn="ctr"/>
-            <a:r>
-              <a:rPr lang="de-DE" sz="900" dirty="0">
-                <a:solidFill>
-                  <a:schemeClr val="bg2">
-                    <a:lumMod val="50000"/>
-                  </a:schemeClr>
-                </a:solidFill>
-                <a:highlight>
-                  <a:srgbClr val="00FF00"/>
-                </a:highlight>
-              </a:rPr>
-              <a:t>192.168.1.144 </a:t>
-            </a:r>
-          </a:p>
-        </p:txBody>
-      </p:sp>
-      <p:grpSp>
-        <p:nvGrpSpPr>
-          <p:cNvPr id="63" name="Group 62">
-            <a:extLst>
-              <a:ext uri="{FF2B5EF4-FFF2-40B4-BE49-F238E27FC236}">
-                <a16:creationId xmlns:a16="http://schemas.microsoft.com/office/drawing/2014/main" id="{A970E67F-4295-4D26-B5BD-761567807F28}"/>
-              </a:ext>
-            </a:extLst>
-          </p:cNvPr>
-          <p:cNvGrpSpPr/>
-          <p:nvPr/>
-        </p:nvGrpSpPr>
-        <p:grpSpPr>
-          <a:xfrm>
-            <a:off x="7388257" y="1825745"/>
-            <a:ext cx="967495" cy="1271318"/>
-            <a:chOff x="9090905" y="4721073"/>
-            <a:chExt cx="967495" cy="1088461"/>
-          </a:xfrm>
-        </p:grpSpPr>
-        <p:sp>
-          <p:nvSpPr>
-            <p:cNvPr id="69" name="Rectangle: Rounded Corners 68">
-              <a:extLst>
-                <a:ext uri="{FF2B5EF4-FFF2-40B4-BE49-F238E27FC236}">
-                  <a16:creationId xmlns:a16="http://schemas.microsoft.com/office/drawing/2014/main" id="{82F4AE9D-8D85-4D55-8D79-0912EDCBF10C}"/>
-                </a:ext>
-              </a:extLst>
-            </p:cNvPr>
-            <p:cNvSpPr/>
-            <p:nvPr/>
-          </p:nvSpPr>
-          <p:spPr>
-            <a:xfrm>
-              <a:off x="9090905" y="4721073"/>
-              <a:ext cx="967495" cy="1088461"/>
-            </a:xfrm>
-            <a:prstGeom prst="roundRect">
-              <a:avLst/>
-            </a:prstGeom>
-            <a:ln>
-              <a:solidFill>
-                <a:schemeClr val="bg1">
-                  <a:lumMod val="50000"/>
-                </a:schemeClr>
-              </a:solidFill>
-            </a:ln>
-          </p:spPr>
-          <p:style>
-            <a:lnRef idx="3">
-              <a:schemeClr val="lt1"/>
-            </a:lnRef>
-            <a:fillRef idx="1">
-              <a:schemeClr val="accent3"/>
-            </a:fillRef>
-            <a:effectRef idx="1">
-              <a:schemeClr val="accent3"/>
-            </a:effectRef>
-            <a:fontRef idx="minor">
-              <a:schemeClr val="lt1"/>
-            </a:fontRef>
-          </p:style>
-          <p:txBody>
-            <a:bodyPr lIns="36000" tIns="36000" rIns="36000" bIns="36000" rtlCol="0" anchor="b"/>
-            <a:lstStyle/>
-            <a:p>
-              <a:pPr algn="ctr"/>
-              <a:r>
-                <a:rPr lang="de-DE" sz="1400" b="1" dirty="0" err="1"/>
-                <a:t>RasPi</a:t>
-              </a:r>
-              <a:endParaRPr lang="de-DE" sz="1100" b="1" dirty="0"/>
-            </a:p>
-            <a:p>
-              <a:pPr algn="ctr"/>
-              <a:r>
-                <a:rPr lang="de-DE" sz="1000" dirty="0" err="1"/>
-                <a:t>Rocrail</a:t>
-              </a:r>
-              <a:r>
-                <a:rPr lang="de-DE" sz="1000" dirty="0"/>
-                <a:t> Server</a:t>
-              </a:r>
-            </a:p>
-            <a:p>
-              <a:pPr algn="ctr"/>
-              <a:r>
-                <a:rPr lang="de-DE" sz="1000" dirty="0" err="1"/>
-                <a:t>RocNetNode</a:t>
-              </a:r>
-              <a:endParaRPr lang="de-DE" sz="1000" dirty="0"/>
-            </a:p>
-            <a:p>
-              <a:pPr algn="ctr"/>
-              <a:r>
-                <a:rPr lang="de-DE" sz="900" dirty="0" err="1">
-                  <a:solidFill>
-                    <a:schemeClr val="bg2">
-                      <a:lumMod val="50000"/>
-                    </a:schemeClr>
-                  </a:solidFill>
-                  <a:highlight>
-                    <a:srgbClr val="00FF00"/>
-                  </a:highlight>
-                </a:rPr>
-                <a:t>railrocpi</a:t>
-              </a:r>
-              <a:r>
-                <a:rPr lang="de-DE" sz="900" dirty="0">
-                  <a:solidFill>
-                    <a:schemeClr val="bg2">
-                      <a:lumMod val="50000"/>
-                    </a:schemeClr>
-                  </a:solidFill>
-                  <a:highlight>
-                    <a:srgbClr val="00FF00"/>
-                  </a:highlight>
-                </a:rPr>
-                <a:t> 192.168.1.140</a:t>
-              </a:r>
-              <a:endParaRPr lang="de-DE" sz="900" dirty="0"/>
-            </a:p>
-          </p:txBody>
-        </p:sp>
-        <p:pic>
-          <p:nvPicPr>
-            <p:cNvPr id="70" name="Picture 10" descr="Bildergebnis fÃ¼r raspberry">
-              <a:extLst>
-                <a:ext uri="{FF2B5EF4-FFF2-40B4-BE49-F238E27FC236}">
-                  <a16:creationId xmlns:a16="http://schemas.microsoft.com/office/drawing/2014/main" id="{234043ED-8654-4348-A034-74A9D5135D44}"/>
-                </a:ext>
-              </a:extLst>
-            </p:cNvPr>
-            <p:cNvPicPr>
-              <a:picLocks noChangeAspect="1" noChangeArrowheads="1"/>
-            </p:cNvPicPr>
-            <p:nvPr/>
-          </p:nvPicPr>
-          <p:blipFill>
-            <a:blip r:embed="rId3">
-              <a:extLst>
-                <a:ext uri="{28A0092B-C50C-407E-A947-70E740481C1C}">
-                  <a14:useLocalDpi xmlns:a14="http://schemas.microsoft.com/office/drawing/2010/main" val="0"/>
-                </a:ext>
-              </a:extLst>
-            </a:blip>
-            <a:srcRect/>
-            <a:stretch>
-              <a:fillRect/>
-            </a:stretch>
-          </p:blipFill>
-          <p:spPr bwMode="auto">
-            <a:xfrm>
-              <a:off x="9421797" y="4747462"/>
-              <a:ext cx="278625" cy="331696"/>
-            </a:xfrm>
-            <a:prstGeom prst="rect">
-              <a:avLst/>
-            </a:prstGeom>
-            <a:noFill/>
-            <a:ln>
-              <a:solidFill>
-                <a:schemeClr val="bg1">
-                  <a:lumMod val="50000"/>
-                </a:schemeClr>
-              </a:solidFill>
-            </a:ln>
-            <a:extLst>
-              <a:ext uri="{909E8E84-426E-40DD-AFC4-6F175D3DCCD1}">
-                <a14:hiddenFill xmlns:a14="http://schemas.microsoft.com/office/drawing/2010/main">
-                  <a:solidFill>
-                    <a:srgbClr val="FFFFFF"/>
-                  </a:solidFill>
-                </a14:hiddenFill>
-              </a:ext>
-            </a:extLst>
-          </p:spPr>
-        </p:pic>
-      </p:grpSp>
-      <p:grpSp>
-        <p:nvGrpSpPr>
-          <p:cNvPr id="66" name="Group 65">
-            <a:extLst>
-              <a:ext uri="{FF2B5EF4-FFF2-40B4-BE49-F238E27FC236}">
-                <a16:creationId xmlns:a16="http://schemas.microsoft.com/office/drawing/2014/main" id="{32C6C292-8CAF-4E30-A629-44B9B5F4263B}"/>
-              </a:ext>
-            </a:extLst>
-          </p:cNvPr>
-          <p:cNvGrpSpPr/>
-          <p:nvPr/>
-        </p:nvGrpSpPr>
-        <p:grpSpPr>
-          <a:xfrm>
-            <a:off x="1488402" y="4807714"/>
-            <a:ext cx="1665111" cy="352658"/>
-            <a:chOff x="5825290" y="3473753"/>
-            <a:chExt cx="1665111" cy="352658"/>
-          </a:xfrm>
-        </p:grpSpPr>
-        <p:sp>
-          <p:nvSpPr>
-            <p:cNvPr id="72" name="Rectangle: Rounded Corners 71">
-              <a:extLst>
-                <a:ext uri="{FF2B5EF4-FFF2-40B4-BE49-F238E27FC236}">
-                  <a16:creationId xmlns:a16="http://schemas.microsoft.com/office/drawing/2014/main" id="{63F06BEB-0BD2-4A65-A4C3-16D736164B4A}"/>
-                </a:ext>
-              </a:extLst>
-            </p:cNvPr>
-            <p:cNvSpPr/>
-            <p:nvPr/>
-          </p:nvSpPr>
-          <p:spPr>
-            <a:xfrm>
-              <a:off x="5825290" y="3473753"/>
-              <a:ext cx="1665111" cy="352658"/>
-            </a:xfrm>
-            <a:prstGeom prst="roundRect">
-              <a:avLst/>
-            </a:prstGeom>
-            <a:noFill/>
-            <a:ln>
-              <a:solidFill>
-                <a:schemeClr val="bg1">
-                  <a:lumMod val="50000"/>
-                </a:schemeClr>
-              </a:solidFill>
-            </a:ln>
-          </p:spPr>
-          <p:style>
-            <a:lnRef idx="3">
-              <a:schemeClr val="lt1"/>
-            </a:lnRef>
-            <a:fillRef idx="1">
-              <a:schemeClr val="accent3"/>
-            </a:fillRef>
-            <a:effectRef idx="1">
-              <a:schemeClr val="accent3"/>
-            </a:effectRef>
-            <a:fontRef idx="minor">
-              <a:schemeClr val="lt1"/>
-            </a:fontRef>
-          </p:style>
-          <p:txBody>
-            <a:bodyPr rtlCol="0" anchor="ctr"/>
-            <a:lstStyle/>
-            <a:p>
-              <a:pPr algn="ctr"/>
-              <a:endParaRPr lang="de-DE" sz="1400" b="1" dirty="0"/>
-            </a:p>
-          </p:txBody>
-        </p:sp>
-        <p:pic>
-          <p:nvPicPr>
-            <p:cNvPr id="1032" name="Picture 8" descr="Ãhnliches Foto">
-              <a:extLst>
-                <a:ext uri="{FF2B5EF4-FFF2-40B4-BE49-F238E27FC236}">
-                  <a16:creationId xmlns:a16="http://schemas.microsoft.com/office/drawing/2014/main" id="{0530D918-7F94-4277-A886-1957187E8110}"/>
-                </a:ext>
-              </a:extLst>
-            </p:cNvPr>
-            <p:cNvPicPr>
-              <a:picLocks noChangeAspect="1" noChangeArrowheads="1"/>
-            </p:cNvPicPr>
-            <p:nvPr/>
-          </p:nvPicPr>
-          <p:blipFill rotWithShape="1">
-            <a:blip r:embed="rId4">
-              <a:extLst>
-                <a:ext uri="{28A0092B-C50C-407E-A947-70E740481C1C}">
-                  <a14:useLocalDpi xmlns:a14="http://schemas.microsoft.com/office/drawing/2010/main" val="0"/>
-                </a:ext>
-              </a:extLst>
-            </a:blip>
-            <a:srcRect t="24430" b="27393"/>
-            <a:stretch/>
-          </p:blipFill>
-          <p:spPr bwMode="auto">
-            <a:xfrm>
-              <a:off x="5928856" y="3519452"/>
-              <a:ext cx="1465462" cy="261258"/>
-            </a:xfrm>
-            <a:prstGeom prst="rect">
-              <a:avLst/>
-            </a:prstGeom>
-            <a:noFill/>
-            <a:extLst>
-              <a:ext uri="{909E8E84-426E-40DD-AFC4-6F175D3DCCD1}">
-                <a14:hiddenFill xmlns:a14="http://schemas.microsoft.com/office/drawing/2010/main">
-                  <a:solidFill>
-                    <a:srgbClr val="FFFFFF"/>
-                  </a:solidFill>
-                </a14:hiddenFill>
-              </a:ext>
-            </a:extLst>
-          </p:spPr>
-        </p:pic>
-      </p:grpSp>
-      <p:grpSp>
-        <p:nvGrpSpPr>
-          <p:cNvPr id="68" name="Group 67">
-            <a:extLst>
-              <a:ext uri="{FF2B5EF4-FFF2-40B4-BE49-F238E27FC236}">
-                <a16:creationId xmlns:a16="http://schemas.microsoft.com/office/drawing/2014/main" id="{8A0384B8-F748-442D-B729-00268AAA74BE}"/>
-              </a:ext>
-            </a:extLst>
-          </p:cNvPr>
-          <p:cNvGrpSpPr/>
-          <p:nvPr/>
-        </p:nvGrpSpPr>
-        <p:grpSpPr>
-          <a:xfrm>
-            <a:off x="1944879" y="2068375"/>
-            <a:ext cx="752156" cy="788916"/>
-            <a:chOff x="8179470" y="1576149"/>
-            <a:chExt cx="752156" cy="788916"/>
-          </a:xfrm>
-        </p:grpSpPr>
-        <p:pic>
-          <p:nvPicPr>
-            <p:cNvPr id="1026" name="Picture 2" descr="http://clipart-library.com/image_gallery/236717.png">
-              <a:extLst>
-                <a:ext uri="{FF2B5EF4-FFF2-40B4-BE49-F238E27FC236}">
-                  <a16:creationId xmlns:a16="http://schemas.microsoft.com/office/drawing/2014/main" id="{11F3E943-E24E-4916-80B8-6BEB29EFB965}"/>
-                </a:ext>
-              </a:extLst>
-            </p:cNvPr>
-            <p:cNvPicPr>
-              <a:picLocks noChangeAspect="1" noChangeArrowheads="1"/>
-            </p:cNvPicPr>
-            <p:nvPr/>
-          </p:nvPicPr>
-          <p:blipFill>
-            <a:blip r:embed="rId5">
-              <a:extLst>
-                <a:ext uri="{28A0092B-C50C-407E-A947-70E740481C1C}">
-                  <a14:useLocalDpi xmlns:a14="http://schemas.microsoft.com/office/drawing/2010/main" val="0"/>
-                </a:ext>
-              </a:extLst>
-            </a:blip>
-            <a:srcRect/>
-            <a:stretch>
-              <a:fillRect/>
-            </a:stretch>
-          </p:blipFill>
-          <p:spPr bwMode="auto">
-            <a:xfrm>
-              <a:off x="8183377" y="1595054"/>
-              <a:ext cx="748249" cy="748249"/>
-            </a:xfrm>
-            <a:prstGeom prst="rect">
-              <a:avLst/>
-            </a:prstGeom>
-            <a:noFill/>
-            <a:extLst>
-              <a:ext uri="{909E8E84-426E-40DD-AFC4-6F175D3DCCD1}">
-                <a14:hiddenFill xmlns:a14="http://schemas.microsoft.com/office/drawing/2010/main">
-                  <a:solidFill>
-                    <a:srgbClr val="FFFFFF"/>
-                  </a:solidFill>
-                </a14:hiddenFill>
-              </a:ext>
-            </a:extLst>
-          </p:spPr>
-        </p:pic>
-        <p:sp>
-          <p:nvSpPr>
-            <p:cNvPr id="78" name="Rectangle: Rounded Corners 77">
-              <a:extLst>
-                <a:ext uri="{FF2B5EF4-FFF2-40B4-BE49-F238E27FC236}">
-                  <a16:creationId xmlns:a16="http://schemas.microsoft.com/office/drawing/2014/main" id="{340E5BA3-AF4F-4A63-B96F-957E74606513}"/>
-                </a:ext>
-              </a:extLst>
-            </p:cNvPr>
-            <p:cNvSpPr/>
-            <p:nvPr/>
-          </p:nvSpPr>
-          <p:spPr>
-            <a:xfrm>
-              <a:off x="8179470" y="1576149"/>
-              <a:ext cx="744524" cy="788916"/>
-            </a:xfrm>
-            <a:prstGeom prst="roundRect">
-              <a:avLst/>
-            </a:prstGeom>
-            <a:noFill/>
-            <a:ln>
-              <a:solidFill>
-                <a:schemeClr val="bg1">
-                  <a:lumMod val="50000"/>
-                </a:schemeClr>
-              </a:solidFill>
-            </a:ln>
-          </p:spPr>
-          <p:style>
-            <a:lnRef idx="3">
-              <a:schemeClr val="lt1"/>
-            </a:lnRef>
-            <a:fillRef idx="1">
-              <a:schemeClr val="accent3"/>
-            </a:fillRef>
-            <a:effectRef idx="1">
-              <a:schemeClr val="accent3"/>
-            </a:effectRef>
-            <a:fontRef idx="minor">
-              <a:schemeClr val="lt1"/>
-            </a:fontRef>
-          </p:style>
-          <p:txBody>
-            <a:bodyPr rtlCol="0" anchor="ctr"/>
-            <a:lstStyle/>
-            <a:p>
-              <a:pPr algn="ctr"/>
-              <a:endParaRPr lang="de-DE" sz="1400" b="1" dirty="0"/>
-            </a:p>
-          </p:txBody>
-        </p:sp>
-      </p:grpSp>
-      <p:cxnSp>
-        <p:nvCxnSpPr>
-          <p:cNvPr id="85" name="Straight Arrow Connector 84">
-            <a:extLst>
-              <a:ext uri="{FF2B5EF4-FFF2-40B4-BE49-F238E27FC236}">
-                <a16:creationId xmlns:a16="http://schemas.microsoft.com/office/drawing/2014/main" id="{9BF8D462-EC99-4E44-82F3-64FB011E1469}"/>
-              </a:ext>
-            </a:extLst>
-          </p:cNvPr>
-          <p:cNvCxnSpPr>
-            <a:cxnSpLocks/>
-            <a:stCxn id="72" idx="0"/>
-            <a:endCxn id="62" idx="2"/>
-          </p:cNvCxnSpPr>
-          <p:nvPr/>
-        </p:nvCxnSpPr>
-        <p:spPr>
-          <a:xfrm flipH="1" flipV="1">
-            <a:off x="2317141" y="4126485"/>
-            <a:ext cx="3817" cy="681229"/>
-          </a:xfrm>
-          <a:prstGeom prst="straightConnector1">
-            <a:avLst/>
-          </a:prstGeom>
-          <a:ln w="19050" cap="rnd" cmpd="sng">
-            <a:solidFill>
-              <a:schemeClr val="tx1">
-                <a:lumMod val="50000"/>
-                <a:lumOff val="50000"/>
-              </a:schemeClr>
-            </a:solidFill>
-            <a:miter lim="800000"/>
-            <a:headEnd type="none" w="med" len="med"/>
-            <a:tailEnd type="none" w="med" len="med"/>
-          </a:ln>
-        </p:spPr>
-        <p:style>
-          <a:lnRef idx="1">
-            <a:schemeClr val="accent1"/>
-          </a:lnRef>
-          <a:fillRef idx="0">
-            <a:schemeClr val="accent1"/>
-          </a:fillRef>
-          <a:effectRef idx="0">
-            <a:schemeClr val="accent1"/>
-          </a:effectRef>
-          <a:fontRef idx="minor">
-            <a:schemeClr val="tx1"/>
-          </a:fontRef>
-        </p:style>
-      </p:cxnSp>
-      <p:cxnSp>
-        <p:nvCxnSpPr>
-          <p:cNvPr id="92" name="Straight Arrow Connector 91">
-            <a:extLst>
-              <a:ext uri="{FF2B5EF4-FFF2-40B4-BE49-F238E27FC236}">
-                <a16:creationId xmlns:a16="http://schemas.microsoft.com/office/drawing/2014/main" id="{C82ED433-19E4-425B-B25D-783AB6660D13}"/>
-              </a:ext>
-            </a:extLst>
-          </p:cNvPr>
-          <p:cNvCxnSpPr>
-            <a:cxnSpLocks/>
-            <a:stCxn id="78" idx="3"/>
-            <a:endCxn id="69" idx="1"/>
-          </p:cNvCxnSpPr>
-          <p:nvPr/>
-        </p:nvCxnSpPr>
-        <p:spPr>
-          <a:xfrm flipV="1">
-            <a:off x="2689403" y="2461404"/>
-            <a:ext cx="4698854" cy="1429"/>
-          </a:xfrm>
-          <a:prstGeom prst="straightConnector1">
-            <a:avLst/>
-          </a:prstGeom>
-          <a:ln w="19050" cap="rnd" cmpd="sng">
-            <a:solidFill>
-              <a:schemeClr val="tx1">
-                <a:lumMod val="50000"/>
-                <a:lumOff val="50000"/>
-              </a:schemeClr>
-            </a:solidFill>
-            <a:miter lim="800000"/>
-            <a:headEnd type="none" w="med" len="med"/>
-            <a:tailEnd type="none" w="med" len="med"/>
-          </a:ln>
-        </p:spPr>
-        <p:style>
-          <a:lnRef idx="1">
-            <a:schemeClr val="accent1"/>
-          </a:lnRef>
-          <a:fillRef idx="0">
-            <a:schemeClr val="accent1"/>
-          </a:fillRef>
-          <a:effectRef idx="0">
-            <a:schemeClr val="accent1"/>
-          </a:effectRef>
-          <a:fontRef idx="minor">
-            <a:schemeClr val="tx1"/>
-          </a:fontRef>
-        </p:style>
-      </p:cxnSp>
-      <p:grpSp>
-        <p:nvGrpSpPr>
-          <p:cNvPr id="90" name="Group 89">
-            <a:extLst>
-              <a:ext uri="{FF2B5EF4-FFF2-40B4-BE49-F238E27FC236}">
-                <a16:creationId xmlns:a16="http://schemas.microsoft.com/office/drawing/2014/main" id="{1F22D035-F1E4-4104-97E2-8FF3B90A38F5}"/>
-              </a:ext>
-            </a:extLst>
-          </p:cNvPr>
-          <p:cNvGrpSpPr/>
-          <p:nvPr/>
-        </p:nvGrpSpPr>
-        <p:grpSpPr>
-          <a:xfrm>
-            <a:off x="359218" y="292602"/>
-            <a:ext cx="1585661" cy="1177547"/>
-            <a:chOff x="1590675" y="242888"/>
-            <a:chExt cx="1585661" cy="1177547"/>
-          </a:xfrm>
-        </p:grpSpPr>
-        <p:pic>
-          <p:nvPicPr>
-            <p:cNvPr id="1036" name="Picture 12" descr="Bildergebnis fÃ¼r tablet">
-              <a:extLst>
-                <a:ext uri="{FF2B5EF4-FFF2-40B4-BE49-F238E27FC236}">
-                  <a16:creationId xmlns:a16="http://schemas.microsoft.com/office/drawing/2014/main" id="{43311141-616D-43B3-B6A1-EB7414DD543F}"/>
-                </a:ext>
-              </a:extLst>
-            </p:cNvPr>
-            <p:cNvPicPr>
-              <a:picLocks noChangeAspect="1" noChangeArrowheads="1"/>
-            </p:cNvPicPr>
-            <p:nvPr/>
-          </p:nvPicPr>
-          <p:blipFill>
-            <a:blip r:embed="rId6">
-              <a:extLst>
-                <a:ext uri="{28A0092B-C50C-407E-A947-70E740481C1C}">
-                  <a14:useLocalDpi xmlns:a14="http://schemas.microsoft.com/office/drawing/2010/main" val="0"/>
-                </a:ext>
-              </a:extLst>
-            </a:blip>
-            <a:srcRect/>
-            <a:stretch>
-              <a:fillRect/>
-            </a:stretch>
-          </p:blipFill>
-          <p:spPr bwMode="auto">
-            <a:xfrm>
-              <a:off x="1590675" y="242888"/>
-              <a:ext cx="1585661" cy="1177547"/>
-            </a:xfrm>
-            <a:prstGeom prst="rect">
-              <a:avLst/>
-            </a:prstGeom>
-            <a:noFill/>
-            <a:extLst>
-              <a:ext uri="{909E8E84-426E-40DD-AFC4-6F175D3DCCD1}">
-                <a14:hiddenFill xmlns:a14="http://schemas.microsoft.com/office/drawing/2010/main">
-                  <a:solidFill>
-                    <a:srgbClr val="FFFFFF"/>
-                  </a:solidFill>
-                </a14:hiddenFill>
-              </a:ext>
-            </a:extLst>
-          </p:spPr>
-        </p:pic>
-        <p:pic>
-          <p:nvPicPr>
-            <p:cNvPr id="1038" name="Picture 14" descr="Bildergebnis fÃ¼r rocrail view">
-              <a:extLst>
-                <a:ext uri="{FF2B5EF4-FFF2-40B4-BE49-F238E27FC236}">
-                  <a16:creationId xmlns:a16="http://schemas.microsoft.com/office/drawing/2014/main" id="{B862343A-E97A-4A8E-90A5-B43A6EFBCE2C}"/>
-                </a:ext>
-              </a:extLst>
-            </p:cNvPr>
-            <p:cNvPicPr>
-              <a:picLocks noChangeAspect="1" noChangeArrowheads="1"/>
-            </p:cNvPicPr>
-            <p:nvPr/>
-          </p:nvPicPr>
-          <p:blipFill>
-            <a:blip r:embed="rId7">
-              <a:extLst>
-                <a:ext uri="{28A0092B-C50C-407E-A947-70E740481C1C}">
-                  <a14:useLocalDpi xmlns:a14="http://schemas.microsoft.com/office/drawing/2010/main" val="0"/>
-                </a:ext>
-              </a:extLst>
-            </a:blip>
-            <a:srcRect/>
-            <a:stretch>
-              <a:fillRect/>
-            </a:stretch>
-          </p:blipFill>
-          <p:spPr bwMode="auto">
-            <a:xfrm>
-              <a:off x="1746682" y="385781"/>
-              <a:ext cx="1310747" cy="872583"/>
-            </a:xfrm>
-            <a:prstGeom prst="rect">
-              <a:avLst/>
-            </a:prstGeom>
-            <a:noFill/>
-            <a:extLst>
-              <a:ext uri="{909E8E84-426E-40DD-AFC4-6F175D3DCCD1}">
-                <a14:hiddenFill xmlns:a14="http://schemas.microsoft.com/office/drawing/2010/main">
-                  <a:solidFill>
-                    <a:srgbClr val="FFFFFF"/>
-                  </a:solidFill>
-                </a14:hiddenFill>
-              </a:ext>
-            </a:extLst>
-          </p:spPr>
-        </p:pic>
-        <p:sp>
-          <p:nvSpPr>
-            <p:cNvPr id="89" name="TextBox 88">
-              <a:extLst>
-                <a:ext uri="{FF2B5EF4-FFF2-40B4-BE49-F238E27FC236}">
-                  <a16:creationId xmlns:a16="http://schemas.microsoft.com/office/drawing/2014/main" id="{4D19BEE6-7233-41B2-B258-9BDF2F034B3F}"/>
-                </a:ext>
-              </a:extLst>
-            </p:cNvPr>
-            <p:cNvSpPr txBox="1"/>
-            <p:nvPr/>
-          </p:nvSpPr>
-          <p:spPr>
-            <a:xfrm>
-              <a:off x="2165838" y="771237"/>
-              <a:ext cx="891591" cy="261610"/>
-            </a:xfrm>
-            <a:prstGeom prst="rect">
-              <a:avLst/>
-            </a:prstGeom>
-            <a:noFill/>
-          </p:spPr>
-          <p:txBody>
-            <a:bodyPr wrap="none" rtlCol="0">
-              <a:spAutoFit/>
-            </a:bodyPr>
-            <a:lstStyle/>
-            <a:p>
-              <a:r>
-                <a:rPr lang="de-DE" sz="1100" dirty="0" err="1">
-                  <a:solidFill>
-                    <a:schemeClr val="tx1">
-                      <a:lumMod val="50000"/>
-                      <a:lumOff val="50000"/>
-                    </a:schemeClr>
-                  </a:solidFill>
-                </a:rPr>
-                <a:t>Rocrail</a:t>
-              </a:r>
-              <a:r>
-                <a:rPr lang="de-DE" sz="1100" dirty="0">
-                  <a:solidFill>
-                    <a:schemeClr val="tx1">
-                      <a:lumMod val="50000"/>
-                      <a:lumOff val="50000"/>
-                    </a:schemeClr>
-                  </a:solidFill>
-                </a:rPr>
-                <a:t> View</a:t>
-              </a:r>
-            </a:p>
-          </p:txBody>
-        </p:sp>
-      </p:grpSp>
-      <p:cxnSp>
-        <p:nvCxnSpPr>
-          <p:cNvPr id="93" name="Straight Connector 92">
-            <a:extLst>
-              <a:ext uri="{FF2B5EF4-FFF2-40B4-BE49-F238E27FC236}">
-                <a16:creationId xmlns:a16="http://schemas.microsoft.com/office/drawing/2014/main" id="{55AD7A43-5393-48ED-853F-13CE6E1C9C8D}"/>
-              </a:ext>
-            </a:extLst>
-          </p:cNvPr>
-          <p:cNvCxnSpPr>
-            <a:cxnSpLocks/>
-            <a:stCxn id="1036" idx="2"/>
-            <a:endCxn id="1026" idx="1"/>
-          </p:cNvCxnSpPr>
-          <p:nvPr/>
-        </p:nvCxnSpPr>
-        <p:spPr>
-          <a:xfrm>
-            <a:off x="1152049" y="1470149"/>
-            <a:ext cx="796737" cy="991256"/>
-          </a:xfrm>
-          <a:prstGeom prst="line">
-            <a:avLst/>
-          </a:prstGeom>
-          <a:ln w="38100">
-            <a:solidFill>
-              <a:schemeClr val="tx1">
-                <a:lumMod val="50000"/>
-                <a:lumOff val="50000"/>
-              </a:schemeClr>
-            </a:solidFill>
-            <a:prstDash val="sysDash"/>
-          </a:ln>
-        </p:spPr>
-        <p:style>
-          <a:lnRef idx="1">
-            <a:schemeClr val="accent1"/>
-          </a:lnRef>
-          <a:fillRef idx="0">
-            <a:schemeClr val="accent1"/>
-          </a:fillRef>
-          <a:effectRef idx="0">
-            <a:schemeClr val="accent1"/>
-          </a:effectRef>
-          <a:fontRef idx="minor">
-            <a:schemeClr val="tx1"/>
-          </a:fontRef>
-        </p:style>
-      </p:cxnSp>
-      <p:sp>
-        <p:nvSpPr>
-          <p:cNvPr id="103" name="Rectangle: Rounded Corners 102">
-            <a:extLst>
-              <a:ext uri="{FF2B5EF4-FFF2-40B4-BE49-F238E27FC236}">
-                <a16:creationId xmlns:a16="http://schemas.microsoft.com/office/drawing/2014/main" id="{22D8A4AD-3BF4-4E25-A56F-8826FCD94348}"/>
-              </a:ext>
-            </a:extLst>
-          </p:cNvPr>
-          <p:cNvSpPr/>
-          <p:nvPr/>
-        </p:nvSpPr>
-        <p:spPr>
-          <a:xfrm>
-            <a:off x="7388257" y="3088168"/>
-            <a:ext cx="967496" cy="361951"/>
-          </a:xfrm>
-          <a:prstGeom prst="roundRect">
-            <a:avLst/>
-          </a:prstGeom>
-          <a:ln>
-            <a:solidFill>
-              <a:schemeClr val="bg1">
-                <a:lumMod val="50000"/>
-              </a:schemeClr>
-            </a:solidFill>
-          </a:ln>
-        </p:spPr>
-        <p:style>
-          <a:lnRef idx="3">
-            <a:schemeClr val="lt1"/>
-          </a:lnRef>
-          <a:fillRef idx="1">
-            <a:schemeClr val="accent3"/>
-          </a:fillRef>
-          <a:effectRef idx="1">
-            <a:schemeClr val="accent3"/>
-          </a:effectRef>
-          <a:fontRef idx="minor">
-            <a:schemeClr val="lt1"/>
-          </a:fontRef>
-        </p:style>
-        <p:txBody>
-          <a:bodyPr rtlCol="0" anchor="ctr"/>
-          <a:lstStyle/>
-          <a:p>
-            <a:pPr algn="ctr"/>
-            <a:r>
-              <a:rPr lang="de-DE" sz="1400" dirty="0"/>
-              <a:t>GCA-Pi01</a:t>
-            </a:r>
-            <a:endParaRPr lang="de-DE" sz="1400" b="1" dirty="0"/>
-          </a:p>
-        </p:txBody>
-      </p:sp>
-      <p:cxnSp>
-        <p:nvCxnSpPr>
-          <p:cNvPr id="105" name="Straight Arrow Connector 104">
-            <a:extLst>
-              <a:ext uri="{FF2B5EF4-FFF2-40B4-BE49-F238E27FC236}">
-                <a16:creationId xmlns:a16="http://schemas.microsoft.com/office/drawing/2014/main" id="{2DDE5DE3-4607-4FE8-BE27-D79C6CBA70CA}"/>
-              </a:ext>
-            </a:extLst>
-          </p:cNvPr>
-          <p:cNvCxnSpPr>
-            <a:cxnSpLocks/>
-            <a:stCxn id="103" idx="2"/>
-            <a:endCxn id="60" idx="0"/>
-          </p:cNvCxnSpPr>
-          <p:nvPr/>
-        </p:nvCxnSpPr>
-        <p:spPr>
-          <a:xfrm flipH="1">
-            <a:off x="7872004" y="3450119"/>
-            <a:ext cx="1" cy="909367"/>
-          </a:xfrm>
-          <a:prstGeom prst="straightConnector1">
-            <a:avLst/>
-          </a:prstGeom>
-          <a:ln w="19050" cap="rnd" cmpd="sng">
-            <a:solidFill>
-              <a:schemeClr val="tx1">
-                <a:lumMod val="50000"/>
-                <a:lumOff val="50000"/>
-              </a:schemeClr>
-            </a:solidFill>
-            <a:miter lim="800000"/>
-            <a:headEnd type="none" w="med" len="med"/>
-            <a:tailEnd type="none" w="med" len="med"/>
-          </a:ln>
-        </p:spPr>
-        <p:style>
-          <a:lnRef idx="1">
-            <a:schemeClr val="accent1"/>
-          </a:lnRef>
-          <a:fillRef idx="0">
-            <a:schemeClr val="accent1"/>
-          </a:fillRef>
-          <a:effectRef idx="0">
-            <a:schemeClr val="accent1"/>
-          </a:effectRef>
-          <a:fontRef idx="minor">
-            <a:schemeClr val="tx1"/>
-          </a:fontRef>
-        </p:style>
-      </p:cxnSp>
-      <p:pic>
-        <p:nvPicPr>
-          <p:cNvPr id="1040" name="Picture 16" descr="https://www.modelleisenbahn-cms.de/images/product_images/popup_images/83331.jpg">
-            <a:extLst>
-              <a:ext uri="{FF2B5EF4-FFF2-40B4-BE49-F238E27FC236}">
-                <a16:creationId xmlns:a16="http://schemas.microsoft.com/office/drawing/2014/main" id="{7808FF14-6642-43E6-8189-72B60BB7E2F8}"/>
-              </a:ext>
-            </a:extLst>
-          </p:cNvPr>
-          <p:cNvPicPr>
-            <a:picLocks noChangeAspect="1" noChangeArrowheads="1"/>
-          </p:cNvPicPr>
-          <p:nvPr/>
-        </p:nvPicPr>
-        <p:blipFill rotWithShape="1">
-          <a:blip r:embed="rId8">
-            <a:extLst>
-              <a:ext uri="{28A0092B-C50C-407E-A947-70E740481C1C}">
-                <a14:useLocalDpi xmlns:a14="http://schemas.microsoft.com/office/drawing/2010/main" val="0"/>
-              </a:ext>
-            </a:extLst>
-          </a:blip>
-          <a:srcRect t="31941" b="36243"/>
-          <a:stretch/>
-        </p:blipFill>
-        <p:spPr bwMode="auto">
-          <a:xfrm>
-            <a:off x="1713147" y="5360296"/>
-            <a:ext cx="1127875" cy="269127"/>
-          </a:xfrm>
-          <a:prstGeom prst="rect">
-            <a:avLst/>
-          </a:prstGeom>
-          <a:noFill/>
-          <a:extLst>
-            <a:ext uri="{909E8E84-426E-40DD-AFC4-6F175D3DCCD1}">
-              <a14:hiddenFill xmlns:a14="http://schemas.microsoft.com/office/drawing/2010/main">
-                <a:solidFill>
-                  <a:srgbClr val="FFFFFF"/>
-                </a:solidFill>
-              </a14:hiddenFill>
-            </a:ext>
-          </a:extLst>
-        </p:spPr>
-      </p:pic>
-      <p:sp>
-        <p:nvSpPr>
-          <p:cNvPr id="113" name="Rectangle: Rounded Corners 112">
-            <a:extLst>
-              <a:ext uri="{FF2B5EF4-FFF2-40B4-BE49-F238E27FC236}">
-                <a16:creationId xmlns:a16="http://schemas.microsoft.com/office/drawing/2014/main" id="{1EFF1075-63F8-418A-9E9E-A32755D1FF1A}"/>
-              </a:ext>
-            </a:extLst>
-          </p:cNvPr>
-          <p:cNvSpPr/>
-          <p:nvPr/>
-        </p:nvSpPr>
-        <p:spPr>
-          <a:xfrm>
-            <a:off x="1484584" y="5320921"/>
-            <a:ext cx="1665111" cy="352658"/>
-          </a:xfrm>
-          <a:prstGeom prst="roundRect">
-            <a:avLst/>
-          </a:prstGeom>
-          <a:noFill/>
-          <a:ln>
-            <a:solidFill>
-              <a:schemeClr val="bg1">
-                <a:lumMod val="50000"/>
-              </a:schemeClr>
-            </a:solidFill>
-          </a:ln>
-        </p:spPr>
-        <p:style>
-          <a:lnRef idx="3">
-            <a:schemeClr val="lt1"/>
-          </a:lnRef>
-          <a:fillRef idx="1">
-            <a:schemeClr val="accent3"/>
-          </a:fillRef>
-          <a:effectRef idx="1">
-            <a:schemeClr val="accent3"/>
-          </a:effectRef>
-          <a:fontRef idx="minor">
-            <a:schemeClr val="lt1"/>
-          </a:fontRef>
-        </p:style>
-        <p:txBody>
-          <a:bodyPr rtlCol="0" anchor="ctr"/>
-          <a:lstStyle/>
-          <a:p>
-            <a:pPr algn="ctr"/>
-            <a:endParaRPr lang="de-DE" sz="1400" b="1" dirty="0"/>
-          </a:p>
-        </p:txBody>
-      </p:sp>
-      <p:sp>
-        <p:nvSpPr>
-          <p:cNvPr id="115" name="Rectangle: Rounded Corners 114">
-            <a:extLst>
-              <a:ext uri="{FF2B5EF4-FFF2-40B4-BE49-F238E27FC236}">
-                <a16:creationId xmlns:a16="http://schemas.microsoft.com/office/drawing/2014/main" id="{CA750C48-86DB-4592-825F-9BD1C78F6F3F}"/>
-              </a:ext>
-            </a:extLst>
-          </p:cNvPr>
-          <p:cNvSpPr/>
-          <p:nvPr/>
-        </p:nvSpPr>
-        <p:spPr>
-          <a:xfrm>
-            <a:off x="1480766" y="5805749"/>
-            <a:ext cx="1665111" cy="553106"/>
-          </a:xfrm>
-          <a:prstGeom prst="roundRect">
-            <a:avLst/>
-          </a:prstGeom>
-          <a:noFill/>
-          <a:ln>
-            <a:solidFill>
-              <a:schemeClr val="bg1">
-                <a:lumMod val="50000"/>
-              </a:schemeClr>
-            </a:solidFill>
-          </a:ln>
-        </p:spPr>
-        <p:style>
-          <a:lnRef idx="3">
-            <a:schemeClr val="lt1"/>
-          </a:lnRef>
-          <a:fillRef idx="1">
-            <a:schemeClr val="accent3"/>
-          </a:fillRef>
-          <a:effectRef idx="1">
-            <a:schemeClr val="accent3"/>
-          </a:effectRef>
-          <a:fontRef idx="minor">
-            <a:schemeClr val="lt1"/>
-          </a:fontRef>
-        </p:style>
-        <p:txBody>
-          <a:bodyPr rtlCol="0" anchor="t"/>
-          <a:lstStyle/>
-          <a:p>
-            <a:pPr algn="ctr"/>
-            <a:r>
-              <a:rPr lang="de-DE" sz="1200" b="1" dirty="0">
-                <a:solidFill>
-                  <a:schemeClr val="tx1">
-                    <a:lumMod val="50000"/>
-                    <a:lumOff val="50000"/>
-                  </a:schemeClr>
-                </a:solidFill>
-              </a:rPr>
-              <a:t>Gleisbesetztmeldung</a:t>
-            </a:r>
-          </a:p>
-        </p:txBody>
-      </p:sp>
-      <p:cxnSp>
-        <p:nvCxnSpPr>
-          <p:cNvPr id="116" name="Straight Arrow Connector 115">
-            <a:extLst>
-              <a:ext uri="{FF2B5EF4-FFF2-40B4-BE49-F238E27FC236}">
-                <a16:creationId xmlns:a16="http://schemas.microsoft.com/office/drawing/2014/main" id="{AC9C7DF3-1055-44DD-9D4E-7987DBC0A1E8}"/>
-              </a:ext>
-            </a:extLst>
-          </p:cNvPr>
-          <p:cNvCxnSpPr>
-            <a:cxnSpLocks/>
-            <a:stCxn id="129" idx="1"/>
-            <a:endCxn id="113" idx="3"/>
-          </p:cNvCxnSpPr>
-          <p:nvPr/>
-        </p:nvCxnSpPr>
-        <p:spPr>
-          <a:xfrm flipH="1" flipV="1">
-            <a:off x="3149695" y="5497250"/>
-            <a:ext cx="353265" cy="2888"/>
-          </a:xfrm>
-          <a:prstGeom prst="straightConnector1">
-            <a:avLst/>
-          </a:prstGeom>
-          <a:ln w="19050" cap="rnd" cmpd="sng">
-            <a:solidFill>
-              <a:schemeClr val="tx1">
-                <a:lumMod val="50000"/>
-                <a:lumOff val="50000"/>
-              </a:schemeClr>
-            </a:solidFill>
-            <a:miter lim="800000"/>
-            <a:headEnd type="none" w="med" len="med"/>
-            <a:tailEnd type="none" w="med" len="med"/>
-          </a:ln>
-        </p:spPr>
-        <p:style>
-          <a:lnRef idx="1">
-            <a:schemeClr val="accent1"/>
-          </a:lnRef>
-          <a:fillRef idx="0">
-            <a:schemeClr val="accent1"/>
-          </a:fillRef>
-          <a:effectRef idx="0">
-            <a:schemeClr val="accent1"/>
-          </a:effectRef>
-          <a:fontRef idx="minor">
-            <a:schemeClr val="tx1"/>
-          </a:fontRef>
-        </p:style>
-      </p:cxnSp>
-      <p:cxnSp>
-        <p:nvCxnSpPr>
-          <p:cNvPr id="117" name="Straight Arrow Connector 116">
-            <a:extLst>
-              <a:ext uri="{FF2B5EF4-FFF2-40B4-BE49-F238E27FC236}">
-                <a16:creationId xmlns:a16="http://schemas.microsoft.com/office/drawing/2014/main" id="{CFBB105E-F852-48D7-80DF-D7DFC3CB74AF}"/>
-              </a:ext>
-            </a:extLst>
-          </p:cNvPr>
-          <p:cNvCxnSpPr>
-            <a:cxnSpLocks/>
-            <a:stCxn id="115" idx="3"/>
-            <a:endCxn id="122" idx="1"/>
-          </p:cNvCxnSpPr>
-          <p:nvPr/>
-        </p:nvCxnSpPr>
-        <p:spPr>
-          <a:xfrm>
-            <a:off x="3145877" y="6082302"/>
-            <a:ext cx="4233821" cy="0"/>
-          </a:xfrm>
-          <a:prstGeom prst="straightConnector1">
-            <a:avLst/>
-          </a:prstGeom>
-          <a:ln w="19050" cap="rnd" cmpd="sng">
-            <a:solidFill>
-              <a:schemeClr val="tx1">
-                <a:lumMod val="50000"/>
-                <a:lumOff val="50000"/>
-              </a:schemeClr>
-            </a:solidFill>
-            <a:miter lim="800000"/>
-            <a:headEnd type="none" w="med" len="med"/>
-            <a:tailEnd type="none" w="med" len="med"/>
-          </a:ln>
-        </p:spPr>
-        <p:style>
-          <a:lnRef idx="1">
-            <a:schemeClr val="accent1"/>
-          </a:lnRef>
-          <a:fillRef idx="0">
-            <a:schemeClr val="accent1"/>
-          </a:fillRef>
-          <a:effectRef idx="0">
-            <a:schemeClr val="accent1"/>
-          </a:effectRef>
-          <a:fontRef idx="minor">
-            <a:schemeClr val="tx1"/>
-          </a:fontRef>
-        </p:style>
-      </p:cxnSp>
-      <p:sp>
-        <p:nvSpPr>
-          <p:cNvPr id="122" name="Rectangle: Rounded Corners 121">
-            <a:extLst>
-              <a:ext uri="{FF2B5EF4-FFF2-40B4-BE49-F238E27FC236}">
-                <a16:creationId xmlns:a16="http://schemas.microsoft.com/office/drawing/2014/main" id="{B0A82005-8F7B-404F-9CDD-3A84E3367336}"/>
-              </a:ext>
-            </a:extLst>
-          </p:cNvPr>
-          <p:cNvSpPr/>
-          <p:nvPr/>
-        </p:nvSpPr>
-        <p:spPr>
-          <a:xfrm>
-            <a:off x="7379698" y="5901326"/>
-            <a:ext cx="976054" cy="361951"/>
-          </a:xfrm>
-          <a:prstGeom prst="roundRect">
-            <a:avLst/>
-          </a:prstGeom>
-          <a:ln>
-            <a:solidFill>
-              <a:schemeClr val="bg1">
-                <a:lumMod val="50000"/>
-              </a:schemeClr>
-            </a:solidFill>
-          </a:ln>
-        </p:spPr>
-        <p:style>
-          <a:lnRef idx="3">
-            <a:schemeClr val="lt1"/>
-          </a:lnRef>
-          <a:fillRef idx="1">
-            <a:schemeClr val="accent3"/>
-          </a:fillRef>
-          <a:effectRef idx="1">
-            <a:schemeClr val="accent3"/>
-          </a:effectRef>
-          <a:fontRef idx="minor">
-            <a:schemeClr val="lt1"/>
-          </a:fontRef>
-        </p:style>
-        <p:txBody>
-          <a:bodyPr rtlCol="0" anchor="ctr"/>
-          <a:lstStyle/>
-          <a:p>
-            <a:pPr algn="ctr"/>
-            <a:r>
-              <a:rPr lang="de-DE" sz="1400" dirty="0"/>
-              <a:t>GCA173</a:t>
-            </a:r>
-            <a:endParaRPr lang="de-DE" sz="1400" b="1" dirty="0"/>
-          </a:p>
-        </p:txBody>
-      </p:sp>
-      <p:sp>
-        <p:nvSpPr>
-          <p:cNvPr id="123" name="Rectangle: Rounded Corners 122">
-            <a:extLst>
-              <a:ext uri="{FF2B5EF4-FFF2-40B4-BE49-F238E27FC236}">
-                <a16:creationId xmlns:a16="http://schemas.microsoft.com/office/drawing/2014/main" id="{53CABF5B-C744-46E7-9EFB-1B94AA18E8DA}"/>
-              </a:ext>
-            </a:extLst>
-          </p:cNvPr>
-          <p:cNvSpPr/>
-          <p:nvPr/>
-        </p:nvSpPr>
-        <p:spPr>
-          <a:xfrm>
-            <a:off x="4988655" y="5320921"/>
-            <a:ext cx="976054" cy="361951"/>
-          </a:xfrm>
-          <a:prstGeom prst="roundRect">
-            <a:avLst/>
-          </a:prstGeom>
-          <a:ln>
-            <a:solidFill>
-              <a:schemeClr val="bg1">
-                <a:lumMod val="50000"/>
-              </a:schemeClr>
-            </a:solidFill>
-          </a:ln>
-        </p:spPr>
-        <p:style>
-          <a:lnRef idx="3">
-            <a:schemeClr val="lt1"/>
-          </a:lnRef>
-          <a:fillRef idx="1">
-            <a:schemeClr val="accent3"/>
-          </a:fillRef>
-          <a:effectRef idx="1">
-            <a:schemeClr val="accent3"/>
-          </a:effectRef>
-          <a:fontRef idx="minor">
-            <a:schemeClr val="lt1"/>
-          </a:fontRef>
-        </p:style>
-        <p:txBody>
-          <a:bodyPr rtlCol="0" anchor="ctr"/>
-          <a:lstStyle/>
-          <a:p>
-            <a:pPr algn="ctr"/>
-            <a:r>
-              <a:rPr lang="de-DE" sz="1400" dirty="0"/>
-              <a:t>GCA-Pi03</a:t>
-            </a:r>
-            <a:endParaRPr lang="de-DE" sz="1400" b="1" dirty="0"/>
-          </a:p>
-        </p:txBody>
-      </p:sp>
-      <p:sp>
-        <p:nvSpPr>
-          <p:cNvPr id="129" name="Rectangle: Rounded Corners 128">
-            <a:extLst>
-              <a:ext uri="{FF2B5EF4-FFF2-40B4-BE49-F238E27FC236}">
-                <a16:creationId xmlns:a16="http://schemas.microsoft.com/office/drawing/2014/main" id="{B9C7F1DB-B97B-4392-B6B9-1A8D70175BD3}"/>
-              </a:ext>
-            </a:extLst>
-          </p:cNvPr>
-          <p:cNvSpPr/>
-          <p:nvPr/>
-        </p:nvSpPr>
-        <p:spPr>
-          <a:xfrm>
-            <a:off x="3502960" y="5319162"/>
-            <a:ext cx="1132429" cy="361951"/>
-          </a:xfrm>
-          <a:prstGeom prst="roundRect">
-            <a:avLst/>
-          </a:prstGeom>
-          <a:ln>
-            <a:solidFill>
-              <a:schemeClr val="bg1">
-                <a:lumMod val="50000"/>
-              </a:schemeClr>
-            </a:solidFill>
-          </a:ln>
-        </p:spPr>
-        <p:style>
-          <a:lnRef idx="3">
-            <a:schemeClr val="lt1"/>
-          </a:lnRef>
-          <a:fillRef idx="1">
-            <a:schemeClr val="accent3"/>
-          </a:fillRef>
-          <a:effectRef idx="1">
-            <a:schemeClr val="accent3"/>
-          </a:effectRef>
-          <a:fontRef idx="minor">
-            <a:schemeClr val="lt1"/>
-          </a:fontRef>
-        </p:style>
-        <p:txBody>
-          <a:bodyPr rtlCol="0" anchor="ctr"/>
-          <a:lstStyle/>
-          <a:p>
-            <a:pPr algn="ctr"/>
-            <a:r>
-              <a:rPr lang="de-DE" sz="1400" dirty="0"/>
-              <a:t>ES-05 </a:t>
-            </a:r>
-            <a:r>
-              <a:rPr lang="de-DE" sz="1400" dirty="0" err="1"/>
-              <a:t>Servo</a:t>
-            </a:r>
-            <a:endParaRPr lang="de-DE" sz="1400" b="1" dirty="0"/>
-          </a:p>
-        </p:txBody>
-      </p:sp>
-      <p:cxnSp>
-        <p:nvCxnSpPr>
-          <p:cNvPr id="133" name="Straight Arrow Connector 132">
-            <a:extLst>
-              <a:ext uri="{FF2B5EF4-FFF2-40B4-BE49-F238E27FC236}">
-                <a16:creationId xmlns:a16="http://schemas.microsoft.com/office/drawing/2014/main" id="{79675A2B-D0BF-40EE-A381-22409206FF7E}"/>
-              </a:ext>
-            </a:extLst>
-          </p:cNvPr>
-          <p:cNvCxnSpPr>
-            <a:cxnSpLocks/>
-            <a:stCxn id="123" idx="1"/>
-            <a:endCxn id="129" idx="3"/>
-          </p:cNvCxnSpPr>
-          <p:nvPr/>
-        </p:nvCxnSpPr>
-        <p:spPr>
-          <a:xfrm flipH="1" flipV="1">
-            <a:off x="4635389" y="5500138"/>
-            <a:ext cx="353266" cy="1759"/>
-          </a:xfrm>
-          <a:prstGeom prst="straightConnector1">
-            <a:avLst/>
-          </a:prstGeom>
-          <a:ln w="19050" cap="rnd" cmpd="sng">
-            <a:solidFill>
-              <a:schemeClr val="tx1">
-                <a:lumMod val="50000"/>
-                <a:lumOff val="50000"/>
-              </a:schemeClr>
-            </a:solidFill>
-            <a:miter lim="800000"/>
-            <a:headEnd type="none" w="med" len="med"/>
-            <a:tailEnd type="none" w="med" len="med"/>
-          </a:ln>
-        </p:spPr>
-        <p:style>
-          <a:lnRef idx="1">
-            <a:schemeClr val="accent1"/>
-          </a:lnRef>
-          <a:fillRef idx="0">
-            <a:schemeClr val="accent1"/>
-          </a:fillRef>
-          <a:effectRef idx="0">
-            <a:schemeClr val="accent1"/>
-          </a:effectRef>
-          <a:fontRef idx="minor">
-            <a:schemeClr val="tx1"/>
-          </a:fontRef>
-        </p:style>
-      </p:cxnSp>
-      <p:sp>
-        <p:nvSpPr>
-          <p:cNvPr id="147" name="Rectangle: Rounded Corners 146">
-            <a:extLst>
-              <a:ext uri="{FF2B5EF4-FFF2-40B4-BE49-F238E27FC236}">
-                <a16:creationId xmlns:a16="http://schemas.microsoft.com/office/drawing/2014/main" id="{8633036C-360A-49A2-BEA4-6F0DF7C072A3}"/>
-              </a:ext>
-            </a:extLst>
-          </p:cNvPr>
-          <p:cNvSpPr/>
-          <p:nvPr/>
-        </p:nvSpPr>
-        <p:spPr>
-          <a:xfrm>
-            <a:off x="4988655" y="4084474"/>
-            <a:ext cx="976054" cy="361951"/>
-          </a:xfrm>
-          <a:prstGeom prst="roundRect">
-            <a:avLst/>
-          </a:prstGeom>
-          <a:ln>
-            <a:solidFill>
-              <a:schemeClr val="bg1">
-                <a:lumMod val="50000"/>
-              </a:schemeClr>
-            </a:solidFill>
-          </a:ln>
-        </p:spPr>
-        <p:style>
-          <a:lnRef idx="3">
-            <a:schemeClr val="lt1"/>
-          </a:lnRef>
-          <a:fillRef idx="1">
-            <a:schemeClr val="accent3"/>
-          </a:fillRef>
-          <a:effectRef idx="1">
-            <a:schemeClr val="accent3"/>
-          </a:effectRef>
-          <a:fontRef idx="minor">
-            <a:schemeClr val="lt1"/>
-          </a:fontRef>
-        </p:style>
-        <p:txBody>
-          <a:bodyPr rtlCol="0" anchor="ctr"/>
-          <a:lstStyle/>
-          <a:p>
-            <a:pPr algn="ctr"/>
-            <a:r>
-              <a:rPr lang="de-DE" sz="1400" dirty="0"/>
-              <a:t>GCA-Pi06</a:t>
-            </a:r>
-            <a:endParaRPr lang="de-DE" sz="1400" b="1" dirty="0"/>
-          </a:p>
-        </p:txBody>
-      </p:sp>
-      <p:cxnSp>
-        <p:nvCxnSpPr>
-          <p:cNvPr id="7" name="Connector: Elbow 6">
-            <a:extLst>
-              <a:ext uri="{FF2B5EF4-FFF2-40B4-BE49-F238E27FC236}">
-                <a16:creationId xmlns:a16="http://schemas.microsoft.com/office/drawing/2014/main" id="{2F312F9A-1E61-48DE-8FFC-276B374911D9}"/>
-              </a:ext>
-            </a:extLst>
-          </p:cNvPr>
-          <p:cNvCxnSpPr>
-            <a:cxnSpLocks/>
-            <a:stCxn id="103" idx="1"/>
-            <a:endCxn id="147" idx="0"/>
-          </p:cNvCxnSpPr>
-          <p:nvPr/>
-        </p:nvCxnSpPr>
-        <p:spPr>
-          <a:xfrm rot="10800000" flipV="1">
-            <a:off x="5476683" y="3269144"/>
-            <a:ext cx="1911575" cy="815330"/>
-          </a:xfrm>
-          <a:prstGeom prst="bentConnector2">
-            <a:avLst/>
-          </a:prstGeom>
-          <a:ln w="19050" cap="rnd" cmpd="sng">
-            <a:solidFill>
-              <a:schemeClr val="tx1">
-                <a:lumMod val="50000"/>
-                <a:lumOff val="50000"/>
-              </a:schemeClr>
-            </a:solidFill>
-            <a:miter lim="800000"/>
-            <a:headEnd type="none" w="med" len="med"/>
-            <a:tailEnd type="none" w="med" len="med"/>
-          </a:ln>
-        </p:spPr>
-        <p:style>
-          <a:lnRef idx="1">
-            <a:schemeClr val="accent1"/>
-          </a:lnRef>
-          <a:fillRef idx="0">
-            <a:schemeClr val="accent1"/>
-          </a:fillRef>
-          <a:effectRef idx="0">
-            <a:schemeClr val="accent1"/>
-          </a:effectRef>
-          <a:fontRef idx="minor">
-            <a:schemeClr val="tx1"/>
-          </a:fontRef>
-        </p:style>
-      </p:cxnSp>
-      <p:cxnSp>
-        <p:nvCxnSpPr>
-          <p:cNvPr id="50" name="Straight Arrow Connector 49">
-            <a:extLst>
-              <a:ext uri="{FF2B5EF4-FFF2-40B4-BE49-F238E27FC236}">
-                <a16:creationId xmlns:a16="http://schemas.microsoft.com/office/drawing/2014/main" id="{FB38C61A-5046-4993-909A-960B96FE376F}"/>
-              </a:ext>
-            </a:extLst>
-          </p:cNvPr>
-          <p:cNvCxnSpPr>
-            <a:cxnSpLocks/>
-            <a:stCxn id="147" idx="2"/>
-            <a:endCxn id="123" idx="0"/>
-          </p:cNvCxnSpPr>
-          <p:nvPr/>
-        </p:nvCxnSpPr>
-        <p:spPr>
-          <a:xfrm>
-            <a:off x="5476682" y="4446425"/>
-            <a:ext cx="0" cy="874496"/>
-          </a:xfrm>
-          <a:prstGeom prst="straightConnector1">
-            <a:avLst/>
-          </a:prstGeom>
-          <a:ln w="19050" cap="rnd" cmpd="sng">
-            <a:solidFill>
-              <a:schemeClr val="tx1">
-                <a:lumMod val="50000"/>
-                <a:lumOff val="50000"/>
-              </a:schemeClr>
-            </a:solidFill>
-            <a:miter lim="800000"/>
-            <a:headEnd type="none" w="med" len="med"/>
-            <a:tailEnd type="none" w="med" len="med"/>
-          </a:ln>
-        </p:spPr>
-        <p:style>
-          <a:lnRef idx="1">
-            <a:schemeClr val="accent1"/>
-          </a:lnRef>
-          <a:fillRef idx="0">
-            <a:schemeClr val="accent1"/>
-          </a:fillRef>
-          <a:effectRef idx="0">
-            <a:schemeClr val="accent1"/>
-          </a:effectRef>
-          <a:fontRef idx="minor">
-            <a:schemeClr val="tx1"/>
-          </a:fontRef>
-        </p:style>
-      </p:cxnSp>
-      <p:pic>
-        <p:nvPicPr>
-          <p:cNvPr id="54" name="Picture 8" descr="Ãhnliches Foto">
-            <a:extLst>
-              <a:ext uri="{FF2B5EF4-FFF2-40B4-BE49-F238E27FC236}">
-                <a16:creationId xmlns:a16="http://schemas.microsoft.com/office/drawing/2014/main" id="{9A0AD2DB-5656-47B9-B29D-88D79964F50A}"/>
-              </a:ext>
-            </a:extLst>
-          </p:cNvPr>
-          <p:cNvPicPr>
-            <a:picLocks noChangeAspect="1" noChangeArrowheads="1"/>
-          </p:cNvPicPr>
-          <p:nvPr/>
-        </p:nvPicPr>
-        <p:blipFill rotWithShape="1">
-          <a:blip r:embed="rId4">
-            <a:extLst>
-              <a:ext uri="{28A0092B-C50C-407E-A947-70E740481C1C}">
-                <a14:useLocalDpi xmlns:a14="http://schemas.microsoft.com/office/drawing/2010/main" val="0"/>
-              </a:ext>
-            </a:extLst>
-          </a:blip>
-          <a:srcRect t="24430" b="27393"/>
-          <a:stretch/>
-        </p:blipFill>
-        <p:spPr bwMode="auto">
-          <a:xfrm>
-            <a:off x="1565747" y="6057698"/>
-            <a:ext cx="1465462" cy="261258"/>
-          </a:xfrm>
-          <a:prstGeom prst="rect">
-            <a:avLst/>
-          </a:prstGeom>
-          <a:noFill/>
-          <a:extLst>
-            <a:ext uri="{909E8E84-426E-40DD-AFC4-6F175D3DCCD1}">
-              <a14:hiddenFill xmlns:a14="http://schemas.microsoft.com/office/drawing/2010/main">
-                <a:solidFill>
-                  <a:srgbClr val="FFFFFF"/>
-                </a:solidFill>
-              </a14:hiddenFill>
-            </a:ext>
-          </a:extLst>
-        </p:spPr>
-      </p:pic>
-      <p:grpSp>
-        <p:nvGrpSpPr>
-          <p:cNvPr id="23" name="Group 22">
-            <a:extLst>
-              <a:ext uri="{FF2B5EF4-FFF2-40B4-BE49-F238E27FC236}">
-                <a16:creationId xmlns:a16="http://schemas.microsoft.com/office/drawing/2014/main" id="{AC808523-9155-49CF-8B20-33CBDA9598F1}"/>
-              </a:ext>
-            </a:extLst>
-          </p:cNvPr>
-          <p:cNvGrpSpPr/>
-          <p:nvPr/>
-        </p:nvGrpSpPr>
-        <p:grpSpPr>
-          <a:xfrm>
-            <a:off x="7499663" y="956674"/>
-            <a:ext cx="736123" cy="698018"/>
-            <a:chOff x="8936383" y="1729011"/>
-            <a:chExt cx="736123" cy="698018"/>
-          </a:xfrm>
-        </p:grpSpPr>
-        <p:sp>
-          <p:nvSpPr>
-            <p:cNvPr id="59" name="Rectangle: Rounded Corners 58">
-              <a:extLst>
-                <a:ext uri="{FF2B5EF4-FFF2-40B4-BE49-F238E27FC236}">
-                  <a16:creationId xmlns:a16="http://schemas.microsoft.com/office/drawing/2014/main" id="{363F3739-8027-4DFE-8DD9-72129ED884DE}"/>
-                </a:ext>
-              </a:extLst>
-            </p:cNvPr>
-            <p:cNvSpPr/>
-            <p:nvPr/>
-          </p:nvSpPr>
-          <p:spPr>
-            <a:xfrm>
-              <a:off x="8936383" y="1729011"/>
-              <a:ext cx="736123" cy="698018"/>
-            </a:xfrm>
-            <a:prstGeom prst="roundRect">
-              <a:avLst/>
-            </a:prstGeom>
-            <a:ln>
-              <a:solidFill>
-                <a:schemeClr val="bg1">
-                  <a:lumMod val="50000"/>
-                </a:schemeClr>
-              </a:solidFill>
-            </a:ln>
-          </p:spPr>
-          <p:style>
-            <a:lnRef idx="3">
-              <a:schemeClr val="lt1"/>
-            </a:lnRef>
-            <a:fillRef idx="1">
-              <a:schemeClr val="accent3"/>
-            </a:fillRef>
-            <a:effectRef idx="1">
-              <a:schemeClr val="accent3"/>
-            </a:effectRef>
-            <a:fontRef idx="minor">
-              <a:schemeClr val="lt1"/>
-            </a:fontRef>
-          </p:style>
-          <p:txBody>
-            <a:bodyPr rtlCol="0" anchor="b"/>
-            <a:lstStyle/>
-            <a:p>
-              <a:pPr algn="ctr"/>
-              <a:r>
-                <a:rPr lang="de-DE" sz="1200" dirty="0"/>
-                <a:t>Netzteil</a:t>
-              </a:r>
-              <a:endParaRPr lang="de-DE" sz="1200" b="1" dirty="0"/>
-            </a:p>
-          </p:txBody>
-        </p:sp>
-        <p:pic>
-          <p:nvPicPr>
-            <p:cNvPr id="22" name="Picture 2" descr="Bildergebnis fÃ¼r strom">
-              <a:extLst>
-                <a:ext uri="{FF2B5EF4-FFF2-40B4-BE49-F238E27FC236}">
-                  <a16:creationId xmlns:a16="http://schemas.microsoft.com/office/drawing/2014/main" id="{81689BF5-F7FD-483E-BBA8-022A287E6169}"/>
-                </a:ext>
-              </a:extLst>
-            </p:cNvPr>
-            <p:cNvPicPr>
-              <a:picLocks noChangeAspect="1" noChangeArrowheads="1"/>
-            </p:cNvPicPr>
-            <p:nvPr/>
-          </p:nvPicPr>
-          <p:blipFill>
-            <a:blip r:embed="rId9">
-              <a:extLst>
-                <a:ext uri="{28A0092B-C50C-407E-A947-70E740481C1C}">
-                  <a14:useLocalDpi xmlns:a14="http://schemas.microsoft.com/office/drawing/2010/main" val="0"/>
-                </a:ext>
-              </a:extLst>
-            </a:blip>
-            <a:srcRect/>
-            <a:stretch>
-              <a:fillRect/>
-            </a:stretch>
-          </p:blipFill>
-          <p:spPr bwMode="auto">
-            <a:xfrm>
-              <a:off x="9125869" y="1833451"/>
-              <a:ext cx="338627" cy="329832"/>
-            </a:xfrm>
-            <a:prstGeom prst="rect">
-              <a:avLst/>
-            </a:prstGeom>
-            <a:noFill/>
-            <a:extLst>
-              <a:ext uri="{909E8E84-426E-40DD-AFC4-6F175D3DCCD1}">
-                <a14:hiddenFill xmlns:a14="http://schemas.microsoft.com/office/drawing/2010/main">
-                  <a:solidFill>
-                    <a:srgbClr val="FFFFFF"/>
-                  </a:solidFill>
-                </a14:hiddenFill>
-              </a:ext>
-            </a:extLst>
-          </p:spPr>
-        </p:pic>
-      </p:grpSp>
-      <p:grpSp>
-        <p:nvGrpSpPr>
-          <p:cNvPr id="64" name="Group 63">
-            <a:extLst>
-              <a:ext uri="{FF2B5EF4-FFF2-40B4-BE49-F238E27FC236}">
-                <a16:creationId xmlns:a16="http://schemas.microsoft.com/office/drawing/2014/main" id="{3B601909-827D-4510-B050-D9DDF734BB6B}"/>
-              </a:ext>
-            </a:extLst>
-          </p:cNvPr>
-          <p:cNvGrpSpPr/>
-          <p:nvPr/>
-        </p:nvGrpSpPr>
-        <p:grpSpPr>
-          <a:xfrm>
-            <a:off x="613523" y="3472612"/>
-            <a:ext cx="736123" cy="698018"/>
-            <a:chOff x="8936383" y="1729011"/>
-            <a:chExt cx="736123" cy="698018"/>
-          </a:xfrm>
-        </p:grpSpPr>
-        <p:sp>
-          <p:nvSpPr>
-            <p:cNvPr id="65" name="Rectangle: Rounded Corners 64">
-              <a:extLst>
-                <a:ext uri="{FF2B5EF4-FFF2-40B4-BE49-F238E27FC236}">
-                  <a16:creationId xmlns:a16="http://schemas.microsoft.com/office/drawing/2014/main" id="{882A7434-69CD-4B0A-8FE0-58C4CC2BA8DA}"/>
-                </a:ext>
-              </a:extLst>
-            </p:cNvPr>
-            <p:cNvSpPr/>
-            <p:nvPr/>
-          </p:nvSpPr>
-          <p:spPr>
-            <a:xfrm>
-              <a:off x="8936383" y="1729011"/>
-              <a:ext cx="736123" cy="698018"/>
-            </a:xfrm>
-            <a:prstGeom prst="roundRect">
-              <a:avLst/>
-            </a:prstGeom>
-            <a:ln>
-              <a:solidFill>
-                <a:schemeClr val="bg1">
-                  <a:lumMod val="50000"/>
-                </a:schemeClr>
-              </a:solidFill>
-            </a:ln>
-          </p:spPr>
-          <p:style>
-            <a:lnRef idx="3">
-              <a:schemeClr val="lt1"/>
-            </a:lnRef>
-            <a:fillRef idx="1">
-              <a:schemeClr val="accent3"/>
-            </a:fillRef>
-            <a:effectRef idx="1">
-              <a:schemeClr val="accent3"/>
-            </a:effectRef>
-            <a:fontRef idx="minor">
-              <a:schemeClr val="lt1"/>
-            </a:fontRef>
-          </p:style>
-          <p:txBody>
-            <a:bodyPr rtlCol="0" anchor="b"/>
-            <a:lstStyle/>
-            <a:p>
-              <a:pPr algn="ctr"/>
-              <a:r>
-                <a:rPr lang="de-DE" sz="1200" dirty="0"/>
-                <a:t>Netzteil</a:t>
-              </a:r>
-              <a:endParaRPr lang="de-DE" sz="1200" b="1" dirty="0"/>
-            </a:p>
-          </p:txBody>
-        </p:sp>
-        <p:pic>
-          <p:nvPicPr>
-            <p:cNvPr id="67" name="Picture 2" descr="Bildergebnis fÃ¼r strom">
-              <a:extLst>
-                <a:ext uri="{FF2B5EF4-FFF2-40B4-BE49-F238E27FC236}">
-                  <a16:creationId xmlns:a16="http://schemas.microsoft.com/office/drawing/2014/main" id="{7F65B7E2-8FFB-4635-83E1-9AF2F671BEB3}"/>
-                </a:ext>
-              </a:extLst>
-            </p:cNvPr>
-            <p:cNvPicPr>
-              <a:picLocks noChangeAspect="1" noChangeArrowheads="1"/>
-            </p:cNvPicPr>
-            <p:nvPr/>
-          </p:nvPicPr>
-          <p:blipFill>
-            <a:blip r:embed="rId9">
-              <a:extLst>
-                <a:ext uri="{28A0092B-C50C-407E-A947-70E740481C1C}">
-                  <a14:useLocalDpi xmlns:a14="http://schemas.microsoft.com/office/drawing/2010/main" val="0"/>
-                </a:ext>
-              </a:extLst>
-            </a:blip>
-            <a:srcRect/>
-            <a:stretch>
-              <a:fillRect/>
-            </a:stretch>
-          </p:blipFill>
-          <p:spPr bwMode="auto">
-            <a:xfrm>
-              <a:off x="9125869" y="1833451"/>
-              <a:ext cx="338627" cy="329832"/>
-            </a:xfrm>
-            <a:prstGeom prst="rect">
-              <a:avLst/>
-            </a:prstGeom>
-            <a:noFill/>
-            <a:extLst>
-              <a:ext uri="{909E8E84-426E-40DD-AFC4-6F175D3DCCD1}">
-                <a14:hiddenFill xmlns:a14="http://schemas.microsoft.com/office/drawing/2010/main">
-                  <a:solidFill>
-                    <a:srgbClr val="FFFFFF"/>
-                  </a:solidFill>
-                </a14:hiddenFill>
-              </a:ext>
-            </a:extLst>
-          </p:spPr>
-        </p:pic>
-      </p:grpSp>
-      <p:grpSp>
-        <p:nvGrpSpPr>
-          <p:cNvPr id="71" name="Group 70">
-            <a:extLst>
-              <a:ext uri="{FF2B5EF4-FFF2-40B4-BE49-F238E27FC236}">
-                <a16:creationId xmlns:a16="http://schemas.microsoft.com/office/drawing/2014/main" id="{CBCE6D92-1FA3-4B25-A378-0EC9F034AFC4}"/>
-              </a:ext>
-            </a:extLst>
-          </p:cNvPr>
-          <p:cNvGrpSpPr/>
-          <p:nvPr/>
-        </p:nvGrpSpPr>
-        <p:grpSpPr>
-          <a:xfrm>
-            <a:off x="3174611" y="1181222"/>
-            <a:ext cx="736123" cy="698018"/>
-            <a:chOff x="8936383" y="1729011"/>
-            <a:chExt cx="736123" cy="698018"/>
-          </a:xfrm>
-        </p:grpSpPr>
-        <p:sp>
-          <p:nvSpPr>
-            <p:cNvPr id="73" name="Rectangle: Rounded Corners 72">
-              <a:extLst>
-                <a:ext uri="{FF2B5EF4-FFF2-40B4-BE49-F238E27FC236}">
-                  <a16:creationId xmlns:a16="http://schemas.microsoft.com/office/drawing/2014/main" id="{99DB6192-4170-4C85-8744-9D18EA668665}"/>
-                </a:ext>
-              </a:extLst>
-            </p:cNvPr>
-            <p:cNvSpPr/>
-            <p:nvPr/>
-          </p:nvSpPr>
-          <p:spPr>
-            <a:xfrm>
-              <a:off x="8936383" y="1729011"/>
-              <a:ext cx="736123" cy="698018"/>
-            </a:xfrm>
-            <a:prstGeom prst="roundRect">
-              <a:avLst/>
-            </a:prstGeom>
-            <a:ln>
-              <a:solidFill>
-                <a:schemeClr val="bg1">
-                  <a:lumMod val="50000"/>
-                </a:schemeClr>
-              </a:solidFill>
-            </a:ln>
-          </p:spPr>
-          <p:style>
-            <a:lnRef idx="3">
-              <a:schemeClr val="lt1"/>
-            </a:lnRef>
-            <a:fillRef idx="1">
-              <a:schemeClr val="accent3"/>
-            </a:fillRef>
-            <a:effectRef idx="1">
-              <a:schemeClr val="accent3"/>
-            </a:effectRef>
-            <a:fontRef idx="minor">
-              <a:schemeClr val="lt1"/>
-            </a:fontRef>
-          </p:style>
-          <p:txBody>
-            <a:bodyPr rtlCol="0" anchor="b"/>
-            <a:lstStyle/>
-            <a:p>
-              <a:pPr algn="ctr"/>
-              <a:r>
-                <a:rPr lang="de-DE" sz="1200" dirty="0"/>
-                <a:t>Netzteil</a:t>
-              </a:r>
-              <a:endParaRPr lang="de-DE" sz="1200" b="1" dirty="0"/>
-            </a:p>
-          </p:txBody>
-        </p:sp>
-        <p:pic>
-          <p:nvPicPr>
-            <p:cNvPr id="74" name="Picture 2" descr="Bildergebnis fÃ¼r strom">
-              <a:extLst>
-                <a:ext uri="{FF2B5EF4-FFF2-40B4-BE49-F238E27FC236}">
-                  <a16:creationId xmlns:a16="http://schemas.microsoft.com/office/drawing/2014/main" id="{55829B32-E458-44DA-B9A4-A072D13F760C}"/>
-                </a:ext>
-              </a:extLst>
-            </p:cNvPr>
-            <p:cNvPicPr>
-              <a:picLocks noChangeAspect="1" noChangeArrowheads="1"/>
-            </p:cNvPicPr>
-            <p:nvPr/>
-          </p:nvPicPr>
-          <p:blipFill>
-            <a:blip r:embed="rId9">
-              <a:extLst>
-                <a:ext uri="{28A0092B-C50C-407E-A947-70E740481C1C}">
-                  <a14:useLocalDpi xmlns:a14="http://schemas.microsoft.com/office/drawing/2010/main" val="0"/>
-                </a:ext>
-              </a:extLst>
-            </a:blip>
-            <a:srcRect/>
-            <a:stretch>
-              <a:fillRect/>
-            </a:stretch>
-          </p:blipFill>
-          <p:spPr bwMode="auto">
-            <a:xfrm>
-              <a:off x="9125869" y="1833451"/>
-              <a:ext cx="338627" cy="329832"/>
-            </a:xfrm>
-            <a:prstGeom prst="rect">
-              <a:avLst/>
-            </a:prstGeom>
-            <a:noFill/>
-            <a:extLst>
-              <a:ext uri="{909E8E84-426E-40DD-AFC4-6F175D3DCCD1}">
-                <a14:hiddenFill xmlns:a14="http://schemas.microsoft.com/office/drawing/2010/main">
-                  <a:solidFill>
-                    <a:srgbClr val="FFFFFF"/>
-                  </a:solidFill>
-                </a14:hiddenFill>
-              </a:ext>
-            </a:extLst>
-          </p:spPr>
-        </p:pic>
-      </p:grpSp>
-      <p:grpSp>
-        <p:nvGrpSpPr>
-          <p:cNvPr id="24" name="Group 23">
-            <a:extLst>
-              <a:ext uri="{FF2B5EF4-FFF2-40B4-BE49-F238E27FC236}">
-                <a16:creationId xmlns:a16="http://schemas.microsoft.com/office/drawing/2014/main" id="{F0D2B0D7-09D9-4249-8C51-E1CE4315561C}"/>
-              </a:ext>
-            </a:extLst>
-          </p:cNvPr>
-          <p:cNvGrpSpPr/>
-          <p:nvPr/>
-        </p:nvGrpSpPr>
-        <p:grpSpPr>
-          <a:xfrm>
-            <a:off x="3427324" y="3916440"/>
-            <a:ext cx="1258360" cy="698018"/>
-            <a:chOff x="3489595" y="3906884"/>
-            <a:chExt cx="1258360" cy="698018"/>
-          </a:xfrm>
-        </p:grpSpPr>
-        <p:sp>
-          <p:nvSpPr>
-            <p:cNvPr id="76" name="Rectangle: Rounded Corners 75">
-              <a:extLst>
-                <a:ext uri="{FF2B5EF4-FFF2-40B4-BE49-F238E27FC236}">
-                  <a16:creationId xmlns:a16="http://schemas.microsoft.com/office/drawing/2014/main" id="{F8B1C0C0-B67E-4CFF-8450-AA7931805FDA}"/>
-                </a:ext>
-              </a:extLst>
-            </p:cNvPr>
-            <p:cNvSpPr/>
-            <p:nvPr/>
-          </p:nvSpPr>
-          <p:spPr>
-            <a:xfrm>
-              <a:off x="3489595" y="3906884"/>
-              <a:ext cx="1258360" cy="698018"/>
-            </a:xfrm>
-            <a:prstGeom prst="roundRect">
-              <a:avLst/>
-            </a:prstGeom>
-            <a:ln>
-              <a:solidFill>
-                <a:schemeClr val="bg1">
-                  <a:lumMod val="50000"/>
-                </a:schemeClr>
-              </a:solidFill>
-            </a:ln>
-          </p:spPr>
-          <p:style>
-            <a:lnRef idx="3">
-              <a:schemeClr val="lt1"/>
-            </a:lnRef>
-            <a:fillRef idx="1">
-              <a:schemeClr val="accent3"/>
-            </a:fillRef>
-            <a:effectRef idx="1">
-              <a:schemeClr val="accent3"/>
-            </a:effectRef>
-            <a:fontRef idx="minor">
-              <a:schemeClr val="lt1"/>
-            </a:fontRef>
-          </p:style>
-          <p:txBody>
-            <a:bodyPr rtlCol="0" anchor="b"/>
-            <a:lstStyle/>
-            <a:p>
-              <a:pPr algn="ctr"/>
-              <a:r>
-                <a:rPr lang="de-DE" sz="1200" dirty="0"/>
-                <a:t>Netzteil 12V </a:t>
-              </a:r>
-              <a:r>
-                <a:rPr lang="de-DE" sz="1200" dirty="0" err="1"/>
-                <a:t>ac</a:t>
-              </a:r>
-              <a:r>
-                <a:rPr lang="de-DE" sz="1200" dirty="0"/>
-                <a:t> </a:t>
-              </a:r>
-            </a:p>
-          </p:txBody>
-        </p:sp>
-        <p:pic>
-          <p:nvPicPr>
-            <p:cNvPr id="77" name="Picture 2" descr="Bildergebnis fÃ¼r strom">
-              <a:extLst>
-                <a:ext uri="{FF2B5EF4-FFF2-40B4-BE49-F238E27FC236}">
-                  <a16:creationId xmlns:a16="http://schemas.microsoft.com/office/drawing/2014/main" id="{968C1683-FEA2-42E9-AD14-ACDE04766D89}"/>
-                </a:ext>
-              </a:extLst>
-            </p:cNvPr>
-            <p:cNvPicPr>
-              <a:picLocks noChangeAspect="1" noChangeArrowheads="1"/>
-            </p:cNvPicPr>
-            <p:nvPr/>
-          </p:nvPicPr>
-          <p:blipFill>
-            <a:blip r:embed="rId9">
-              <a:extLst>
-                <a:ext uri="{28A0092B-C50C-407E-A947-70E740481C1C}">
-                  <a14:useLocalDpi xmlns:a14="http://schemas.microsoft.com/office/drawing/2010/main" val="0"/>
-                </a:ext>
-              </a:extLst>
-            </a:blip>
-            <a:srcRect/>
-            <a:stretch>
-              <a:fillRect/>
-            </a:stretch>
-          </p:blipFill>
-          <p:spPr bwMode="auto">
-            <a:xfrm>
-              <a:off x="3905983" y="4019713"/>
-              <a:ext cx="338627" cy="329832"/>
-            </a:xfrm>
-            <a:prstGeom prst="rect">
-              <a:avLst/>
-            </a:prstGeom>
-            <a:noFill/>
-            <a:extLst>
-              <a:ext uri="{909E8E84-426E-40DD-AFC4-6F175D3DCCD1}">
-                <a14:hiddenFill xmlns:a14="http://schemas.microsoft.com/office/drawing/2010/main">
-                  <a:solidFill>
-                    <a:srgbClr val="FFFFFF"/>
-                  </a:solidFill>
-                </a14:hiddenFill>
-              </a:ext>
-            </a:extLst>
-          </p:spPr>
-        </p:pic>
-      </p:grpSp>
-      <p:cxnSp>
-        <p:nvCxnSpPr>
-          <p:cNvPr id="79" name="Straight Arrow Connector 78">
-            <a:extLst>
-              <a:ext uri="{FF2B5EF4-FFF2-40B4-BE49-F238E27FC236}">
-                <a16:creationId xmlns:a16="http://schemas.microsoft.com/office/drawing/2014/main" id="{42E65DC0-28E6-4BD9-980D-C7A2613BF44E}"/>
-              </a:ext>
-            </a:extLst>
-          </p:cNvPr>
-          <p:cNvCxnSpPr>
-            <a:cxnSpLocks/>
-            <a:stCxn id="147" idx="1"/>
-            <a:endCxn id="76" idx="3"/>
-          </p:cNvCxnSpPr>
-          <p:nvPr/>
-        </p:nvCxnSpPr>
-        <p:spPr>
-          <a:xfrm flipH="1" flipV="1">
-            <a:off x="4685684" y="4265449"/>
-            <a:ext cx="302971" cy="1"/>
-          </a:xfrm>
-          <a:prstGeom prst="straightConnector1">
-            <a:avLst/>
-          </a:prstGeom>
-          <a:ln w="19050" cap="rnd" cmpd="sng">
-            <a:solidFill>
-              <a:schemeClr val="tx1">
-                <a:lumMod val="50000"/>
-                <a:lumOff val="50000"/>
-              </a:schemeClr>
-            </a:solidFill>
-            <a:miter lim="800000"/>
-            <a:headEnd type="none" w="med" len="med"/>
-            <a:tailEnd type="none" w="med" len="med"/>
-          </a:ln>
-        </p:spPr>
-        <p:style>
-          <a:lnRef idx="1">
-            <a:schemeClr val="accent1"/>
-          </a:lnRef>
-          <a:fillRef idx="0">
-            <a:schemeClr val="accent1"/>
-          </a:fillRef>
-          <a:effectRef idx="0">
-            <a:schemeClr val="accent1"/>
-          </a:effectRef>
-          <a:fontRef idx="minor">
-            <a:schemeClr val="tx1"/>
-          </a:fontRef>
-        </p:style>
-      </p:cxnSp>
-      <p:cxnSp>
-        <p:nvCxnSpPr>
-          <p:cNvPr id="80" name="Straight Arrow Connector 79">
-            <a:extLst>
-              <a:ext uri="{FF2B5EF4-FFF2-40B4-BE49-F238E27FC236}">
-                <a16:creationId xmlns:a16="http://schemas.microsoft.com/office/drawing/2014/main" id="{16750294-DF37-4EE6-B611-CF5DD86E41CA}"/>
-              </a:ext>
-            </a:extLst>
-          </p:cNvPr>
-          <p:cNvCxnSpPr>
-            <a:cxnSpLocks/>
-            <a:stCxn id="59" idx="2"/>
-            <a:endCxn id="69" idx="0"/>
-          </p:cNvCxnSpPr>
-          <p:nvPr/>
-        </p:nvCxnSpPr>
-        <p:spPr>
-          <a:xfrm>
-            <a:off x="7867725" y="1654692"/>
-            <a:ext cx="4280" cy="171053"/>
-          </a:xfrm>
-          <a:prstGeom prst="straightConnector1">
-            <a:avLst/>
-          </a:prstGeom>
-          <a:ln w="19050" cap="rnd" cmpd="sng">
-            <a:solidFill>
-              <a:schemeClr val="tx1">
-                <a:lumMod val="50000"/>
-                <a:lumOff val="50000"/>
-              </a:schemeClr>
-            </a:solidFill>
-            <a:miter lim="800000"/>
-            <a:headEnd type="none" w="med" len="med"/>
-            <a:tailEnd type="none" w="med" len="med"/>
-          </a:ln>
-        </p:spPr>
-        <p:style>
-          <a:lnRef idx="1">
-            <a:schemeClr val="accent1"/>
-          </a:lnRef>
-          <a:fillRef idx="0">
-            <a:schemeClr val="accent1"/>
-          </a:fillRef>
-          <a:effectRef idx="0">
-            <a:schemeClr val="accent1"/>
-          </a:effectRef>
-          <a:fontRef idx="minor">
-            <a:schemeClr val="tx1"/>
-          </a:fontRef>
-        </p:style>
-      </p:cxnSp>
-      <p:cxnSp>
-        <p:nvCxnSpPr>
-          <p:cNvPr id="81" name="Connector: Elbow 80">
-            <a:extLst>
-              <a:ext uri="{FF2B5EF4-FFF2-40B4-BE49-F238E27FC236}">
-                <a16:creationId xmlns:a16="http://schemas.microsoft.com/office/drawing/2014/main" id="{203F1856-DA26-47D6-BF5A-BFE65A68CE37}"/>
-              </a:ext>
-            </a:extLst>
-          </p:cNvPr>
-          <p:cNvCxnSpPr>
-            <a:cxnSpLocks/>
-            <a:stCxn id="73" idx="1"/>
-            <a:endCxn id="78" idx="0"/>
-          </p:cNvCxnSpPr>
-          <p:nvPr/>
-        </p:nvCxnSpPr>
-        <p:spPr>
-          <a:xfrm rot="10800000" flipV="1">
-            <a:off x="2317141" y="1530231"/>
-            <a:ext cx="857470" cy="538144"/>
-          </a:xfrm>
-          <a:prstGeom prst="bentConnector2">
-            <a:avLst/>
-          </a:prstGeom>
-          <a:ln w="19050" cap="rnd" cmpd="sng">
-            <a:solidFill>
-              <a:schemeClr val="tx1">
-                <a:lumMod val="50000"/>
-                <a:lumOff val="50000"/>
-              </a:schemeClr>
-            </a:solidFill>
-            <a:miter lim="800000"/>
-            <a:headEnd type="none" w="med" len="med"/>
-            <a:tailEnd type="none" w="med" len="med"/>
-          </a:ln>
-        </p:spPr>
-        <p:style>
-          <a:lnRef idx="1">
-            <a:schemeClr val="accent1"/>
-          </a:lnRef>
-          <a:fillRef idx="0">
-            <a:schemeClr val="accent1"/>
-          </a:fillRef>
-          <a:effectRef idx="0">
-            <a:schemeClr val="accent1"/>
-          </a:effectRef>
-          <a:fontRef idx="minor">
-            <a:schemeClr val="tx1"/>
-          </a:fontRef>
-        </p:style>
-      </p:cxnSp>
-      <p:cxnSp>
-        <p:nvCxnSpPr>
-          <p:cNvPr id="84" name="Straight Arrow Connector 83">
-            <a:extLst>
-              <a:ext uri="{FF2B5EF4-FFF2-40B4-BE49-F238E27FC236}">
-                <a16:creationId xmlns:a16="http://schemas.microsoft.com/office/drawing/2014/main" id="{9ABB9810-0FB2-4FC6-88E7-76B1E35F72DB}"/>
-              </a:ext>
-            </a:extLst>
-          </p:cNvPr>
-          <p:cNvCxnSpPr>
-            <a:cxnSpLocks/>
-            <a:stCxn id="65" idx="3"/>
-            <a:endCxn id="62" idx="1"/>
-          </p:cNvCxnSpPr>
-          <p:nvPr/>
-        </p:nvCxnSpPr>
-        <p:spPr>
-          <a:xfrm>
-            <a:off x="1349646" y="3821621"/>
-            <a:ext cx="417664" cy="1"/>
-          </a:xfrm>
-          <a:prstGeom prst="straightConnector1">
-            <a:avLst/>
-          </a:prstGeom>
-          <a:ln w="19050" cap="rnd" cmpd="sng">
-            <a:solidFill>
-              <a:schemeClr val="tx1">
-                <a:lumMod val="50000"/>
-                <a:lumOff val="50000"/>
-              </a:schemeClr>
-            </a:solidFill>
-            <a:miter lim="800000"/>
-            <a:headEnd type="none" w="med" len="med"/>
-            <a:tailEnd type="none" w="med" len="med"/>
-          </a:ln>
-        </p:spPr>
-        <p:style>
-          <a:lnRef idx="1">
-            <a:schemeClr val="accent1"/>
-          </a:lnRef>
-          <a:fillRef idx="0">
-            <a:schemeClr val="accent1"/>
-          </a:fillRef>
-          <a:effectRef idx="0">
-            <a:schemeClr val="accent1"/>
-          </a:effectRef>
-          <a:fontRef idx="minor">
-            <a:schemeClr val="tx1"/>
-          </a:fontRef>
-        </p:style>
-      </p:cxnSp>
-      <p:grpSp>
-        <p:nvGrpSpPr>
-          <p:cNvPr id="53" name="Group 52">
-            <a:extLst>
-              <a:ext uri="{FF2B5EF4-FFF2-40B4-BE49-F238E27FC236}">
-                <a16:creationId xmlns:a16="http://schemas.microsoft.com/office/drawing/2014/main" id="{FB3381F3-31F4-41FA-ABC7-799823D700A7}"/>
-              </a:ext>
-            </a:extLst>
-          </p:cNvPr>
-          <p:cNvGrpSpPr/>
-          <p:nvPr/>
-        </p:nvGrpSpPr>
-        <p:grpSpPr>
-          <a:xfrm>
-            <a:off x="6301601" y="5152887"/>
-            <a:ext cx="736123" cy="698018"/>
-            <a:chOff x="8936383" y="1729011"/>
-            <a:chExt cx="736123" cy="698018"/>
-          </a:xfrm>
-        </p:grpSpPr>
-        <p:sp>
-          <p:nvSpPr>
-            <p:cNvPr id="55" name="Rectangle: Rounded Corners 54">
-              <a:extLst>
-                <a:ext uri="{FF2B5EF4-FFF2-40B4-BE49-F238E27FC236}">
-                  <a16:creationId xmlns:a16="http://schemas.microsoft.com/office/drawing/2014/main" id="{E4350A66-84F1-45AD-865D-9CA79778F79A}"/>
-                </a:ext>
-              </a:extLst>
-            </p:cNvPr>
-            <p:cNvSpPr/>
-            <p:nvPr/>
-          </p:nvSpPr>
-          <p:spPr>
-            <a:xfrm>
-              <a:off x="8936383" y="1729011"/>
-              <a:ext cx="736123" cy="698018"/>
-            </a:xfrm>
-            <a:prstGeom prst="roundRect">
-              <a:avLst/>
-            </a:prstGeom>
-            <a:ln>
-              <a:solidFill>
-                <a:schemeClr val="bg1">
-                  <a:lumMod val="50000"/>
-                </a:schemeClr>
-              </a:solidFill>
-            </a:ln>
-          </p:spPr>
-          <p:style>
-            <a:lnRef idx="3">
-              <a:schemeClr val="lt1"/>
-            </a:lnRef>
-            <a:fillRef idx="1">
-              <a:schemeClr val="accent3"/>
-            </a:fillRef>
-            <a:effectRef idx="1">
-              <a:schemeClr val="accent3"/>
-            </a:effectRef>
-            <a:fontRef idx="minor">
-              <a:schemeClr val="lt1"/>
-            </a:fontRef>
-          </p:style>
-          <p:txBody>
-            <a:bodyPr rtlCol="0" anchor="b"/>
-            <a:lstStyle/>
-            <a:p>
-              <a:pPr algn="ctr"/>
-              <a:r>
-                <a:rPr lang="de-DE" sz="1200" dirty="0"/>
-                <a:t>Netzteil</a:t>
-              </a:r>
-              <a:endParaRPr lang="de-DE" sz="1200" b="1" dirty="0"/>
-            </a:p>
-          </p:txBody>
-        </p:sp>
-        <p:pic>
-          <p:nvPicPr>
-            <p:cNvPr id="56" name="Picture 2" descr="Bildergebnis fÃ¼r strom">
-              <a:extLst>
-                <a:ext uri="{FF2B5EF4-FFF2-40B4-BE49-F238E27FC236}">
-                  <a16:creationId xmlns:a16="http://schemas.microsoft.com/office/drawing/2014/main" id="{63DF19B5-E917-4FBC-95D1-A5BA5FF2B55B}"/>
-                </a:ext>
-              </a:extLst>
-            </p:cNvPr>
-            <p:cNvPicPr>
-              <a:picLocks noChangeAspect="1" noChangeArrowheads="1"/>
-            </p:cNvPicPr>
-            <p:nvPr/>
-          </p:nvPicPr>
-          <p:blipFill>
-            <a:blip r:embed="rId9">
-              <a:extLst>
-                <a:ext uri="{28A0092B-C50C-407E-A947-70E740481C1C}">
-                  <a14:useLocalDpi xmlns:a14="http://schemas.microsoft.com/office/drawing/2010/main" val="0"/>
-                </a:ext>
-              </a:extLst>
-            </a:blip>
-            <a:srcRect/>
-            <a:stretch>
-              <a:fillRect/>
-            </a:stretch>
-          </p:blipFill>
-          <p:spPr bwMode="auto">
-            <a:xfrm>
-              <a:off x="9125869" y="1833451"/>
-              <a:ext cx="338627" cy="329832"/>
-            </a:xfrm>
-            <a:prstGeom prst="rect">
-              <a:avLst/>
-            </a:prstGeom>
-            <a:noFill/>
-            <a:extLst>
-              <a:ext uri="{909E8E84-426E-40DD-AFC4-6F175D3DCCD1}">
-                <a14:hiddenFill xmlns:a14="http://schemas.microsoft.com/office/drawing/2010/main">
-                  <a:solidFill>
-                    <a:srgbClr val="FFFFFF"/>
-                  </a:solidFill>
-                </a14:hiddenFill>
-              </a:ext>
-            </a:extLst>
-          </p:spPr>
-        </p:pic>
-      </p:grpSp>
-      <p:cxnSp>
-        <p:nvCxnSpPr>
-          <p:cNvPr id="57" name="Straight Arrow Connector 56">
-            <a:extLst>
-              <a:ext uri="{FF2B5EF4-FFF2-40B4-BE49-F238E27FC236}">
-                <a16:creationId xmlns:a16="http://schemas.microsoft.com/office/drawing/2014/main" id="{40C59BEC-2E86-4E8F-BD9C-7D7AAF802D8C}"/>
-              </a:ext>
-            </a:extLst>
-          </p:cNvPr>
-          <p:cNvCxnSpPr>
-            <a:cxnSpLocks/>
-            <a:stCxn id="55" idx="1"/>
-            <a:endCxn id="123" idx="3"/>
-          </p:cNvCxnSpPr>
-          <p:nvPr/>
-        </p:nvCxnSpPr>
-        <p:spPr>
-          <a:xfrm flipH="1">
-            <a:off x="5964709" y="5501896"/>
-            <a:ext cx="336892" cy="1"/>
-          </a:xfrm>
-          <a:prstGeom prst="straightConnector1">
-            <a:avLst/>
-          </a:prstGeom>
-          <a:ln w="19050" cap="rnd" cmpd="sng">
-            <a:solidFill>
-              <a:schemeClr val="tx1">
-                <a:lumMod val="50000"/>
-                <a:lumOff val="50000"/>
-              </a:schemeClr>
-            </a:solidFill>
-            <a:miter lim="800000"/>
-            <a:headEnd type="none" w="med" len="med"/>
-            <a:tailEnd type="none" w="med" len="med"/>
-          </a:ln>
-        </p:spPr>
-        <p:style>
-          <a:lnRef idx="1">
-            <a:schemeClr val="accent1"/>
-          </a:lnRef>
-          <a:fillRef idx="0">
-            <a:schemeClr val="accent1"/>
-          </a:fillRef>
-          <a:effectRef idx="0">
-            <a:schemeClr val="accent1"/>
-          </a:effectRef>
-          <a:fontRef idx="minor">
-            <a:schemeClr val="tx1"/>
-          </a:fontRef>
-        </p:style>
-      </p:cxnSp>
-      <p:sp>
-        <p:nvSpPr>
-          <p:cNvPr id="60" name="Rectangle: Rounded Corners 59">
-            <a:extLst>
-              <a:ext uri="{FF2B5EF4-FFF2-40B4-BE49-F238E27FC236}">
-                <a16:creationId xmlns:a16="http://schemas.microsoft.com/office/drawing/2014/main" id="{F52E15BA-2B62-4EEF-BB87-A8A763376AE1}"/>
-              </a:ext>
-            </a:extLst>
-          </p:cNvPr>
-          <p:cNvSpPr/>
-          <p:nvPr/>
-        </p:nvSpPr>
-        <p:spPr>
-          <a:xfrm>
-            <a:off x="7388256" y="4359486"/>
-            <a:ext cx="967496" cy="361951"/>
-          </a:xfrm>
-          <a:prstGeom prst="roundRect">
-            <a:avLst/>
-          </a:prstGeom>
-          <a:ln>
-            <a:solidFill>
-              <a:schemeClr val="bg1">
-                <a:lumMod val="50000"/>
-              </a:schemeClr>
-            </a:solidFill>
-          </a:ln>
-        </p:spPr>
-        <p:style>
-          <a:lnRef idx="3">
-            <a:schemeClr val="lt1"/>
-          </a:lnRef>
-          <a:fillRef idx="1">
-            <a:schemeClr val="accent3"/>
-          </a:fillRef>
-          <a:effectRef idx="1">
-            <a:schemeClr val="accent3"/>
-          </a:effectRef>
-          <a:fontRef idx="minor">
-            <a:schemeClr val="lt1"/>
-          </a:fontRef>
-        </p:style>
-        <p:txBody>
-          <a:bodyPr rtlCol="0" anchor="ctr"/>
-          <a:lstStyle/>
-          <a:p>
-            <a:pPr algn="ctr"/>
-            <a:r>
-              <a:rPr lang="de-DE" sz="1400" dirty="0"/>
-              <a:t>GCA-Pi02</a:t>
-            </a:r>
-            <a:endParaRPr lang="de-DE" sz="1400" b="1" dirty="0"/>
-          </a:p>
-        </p:txBody>
-      </p:sp>
-      <p:cxnSp>
-        <p:nvCxnSpPr>
-          <p:cNvPr id="61" name="Straight Arrow Connector 60">
-            <a:extLst>
-              <a:ext uri="{FF2B5EF4-FFF2-40B4-BE49-F238E27FC236}">
-                <a16:creationId xmlns:a16="http://schemas.microsoft.com/office/drawing/2014/main" id="{E8FECA25-DF99-47A7-8BA0-DC0242C80503}"/>
-              </a:ext>
-            </a:extLst>
-          </p:cNvPr>
-          <p:cNvCxnSpPr>
-            <a:cxnSpLocks/>
-            <a:stCxn id="60" idx="2"/>
-            <a:endCxn id="122" idx="0"/>
-          </p:cNvCxnSpPr>
-          <p:nvPr/>
-        </p:nvCxnSpPr>
-        <p:spPr>
-          <a:xfrm flipH="1">
-            <a:off x="7867725" y="4721437"/>
-            <a:ext cx="4279" cy="1179889"/>
-          </a:xfrm>
-          <a:prstGeom prst="straightConnector1">
-            <a:avLst/>
-          </a:prstGeom>
-          <a:ln w="19050" cap="rnd" cmpd="sng">
-            <a:solidFill>
-              <a:schemeClr val="tx1">
-                <a:lumMod val="50000"/>
-                <a:lumOff val="50000"/>
-              </a:schemeClr>
-            </a:solidFill>
-            <a:miter lim="800000"/>
-            <a:headEnd type="none" w="med" len="med"/>
-            <a:tailEnd type="none" w="med" len="med"/>
-          </a:ln>
-        </p:spPr>
-        <p:style>
-          <a:lnRef idx="1">
-            <a:schemeClr val="accent1"/>
-          </a:lnRef>
-          <a:fillRef idx="0">
-            <a:schemeClr val="accent1"/>
-          </a:fillRef>
-          <a:effectRef idx="0">
-            <a:schemeClr val="accent1"/>
-          </a:effectRef>
-          <a:fontRef idx="minor">
-            <a:schemeClr val="tx1"/>
-          </a:fontRef>
-        </p:style>
-      </p:cxnSp>
-      <p:sp>
-        <p:nvSpPr>
-          <p:cNvPr id="2" name="&quot;Not Allowed&quot; Symbol 1">
-            <a:extLst>
-              <a:ext uri="{FF2B5EF4-FFF2-40B4-BE49-F238E27FC236}">
-                <a16:creationId xmlns:a16="http://schemas.microsoft.com/office/drawing/2014/main" id="{F2D6AD19-E911-48BC-BF5E-A25091EBEA2F}"/>
-              </a:ext>
-            </a:extLst>
-          </p:cNvPr>
-          <p:cNvSpPr/>
-          <p:nvPr/>
-        </p:nvSpPr>
-        <p:spPr>
-          <a:xfrm rot="5400000">
-            <a:off x="7410524" y="848483"/>
-            <a:ext cx="914400" cy="914400"/>
-          </a:xfrm>
-          <a:prstGeom prst="noSmoking">
-            <a:avLst>
-              <a:gd name="adj" fmla="val 7841"/>
-            </a:avLst>
-          </a:prstGeom>
-          <a:solidFill>
-            <a:srgbClr val="FF0000"/>
-          </a:solidFill>
-        </p:spPr>
-        <p:style>
-          <a:lnRef idx="2">
-            <a:schemeClr val="accent1">
-              <a:shade val="50000"/>
-            </a:schemeClr>
-          </a:lnRef>
-          <a:fillRef idx="1">
-            <a:schemeClr val="accent1"/>
-          </a:fillRef>
-          <a:effectRef idx="0">
-            <a:schemeClr val="accent1"/>
-          </a:effectRef>
-          <a:fontRef idx="minor">
-            <a:schemeClr val="lt1"/>
-          </a:fontRef>
-        </p:style>
-        <p:txBody>
-          <a:bodyPr rtlCol="0" anchor="ctr"/>
-          <a:lstStyle/>
-          <a:p>
-            <a:pPr algn="ctr"/>
-            <a:endParaRPr lang="de-DE">
-              <a:solidFill>
-                <a:schemeClr val="tx1"/>
-              </a:solidFill>
-            </a:endParaRPr>
-          </a:p>
-        </p:txBody>
-      </p:sp>
-    </p:spTree>
-    <p:extLst>
-      <p:ext uri="{BB962C8B-B14F-4D97-AF65-F5344CB8AC3E}">
-        <p14:creationId xmlns:p14="http://schemas.microsoft.com/office/powerpoint/2010/main" val="867983266"/>
       </p:ext>
     </p:extLst>
   </p:cSld>

</xml_diff>